<commit_message>
update prezentare QA Automation 2.2
</commit_message>
<xml_diff>
--- a/suportdecurs/QA Automation 2.2.pptx
+++ b/suportdecurs/QA Automation 2.2.pptx
@@ -21,6 +21,9 @@
     <p:sldId id="269" r:id="rId15"/>
     <p:sldId id="270" r:id="rId16"/>
     <p:sldId id="271" r:id="rId17"/>
+    <p:sldId id="272" r:id="rId18"/>
+    <p:sldId id="273" r:id="rId19"/>
+    <p:sldId id="274" r:id="rId20"/>
   </p:sldIdLst>
   <p:sldSz cx="12192000" cy="6858000"/>
   <p:notesSz cx="6858000" cy="9144000"/>
@@ -12152,6 +12155,4105 @@
 </p:sld>
 </file>
 
+<file path=ppt/slides/slide17.xml><?xml version="1.0" encoding="utf-8"?>
+<p:sld xmlns:a="http://schemas.openxmlformats.org/drawingml/2006/main" xmlns:r="http://schemas.openxmlformats.org/officeDocument/2006/relationships" xmlns:p="http://schemas.openxmlformats.org/presentationml/2006/main">
+  <p:cSld>
+    <p:bg>
+      <p:bgPr>
+        <a:solidFill>
+          <a:schemeClr val="bg1"/>
+        </a:solidFill>
+        <a:effectLst/>
+      </p:bgPr>
+    </p:bg>
+    <p:spTree>
+      <p:nvGrpSpPr>
+        <p:cNvPr id="1" name=""/>
+        <p:cNvGrpSpPr/>
+        <p:nvPr/>
+      </p:nvGrpSpPr>
+      <p:grpSpPr>
+        <a:xfrm>
+          <a:off x="0" y="0"/>
+          <a:ext cx="0" cy="0"/>
+          <a:chOff x="0" y="0"/>
+          <a:chExt cx="0" cy="0"/>
+        </a:xfrm>
+      </p:grpSpPr>
+      <p:sp useBgFill="1">
+        <p:nvSpPr>
+          <p:cNvPr id="9" name="Rectangle 8">
+            <a:extLst>
+              <a:ext uri="{FF2B5EF4-FFF2-40B4-BE49-F238E27FC236}">
+                <a16:creationId xmlns:a16="http://schemas.microsoft.com/office/drawing/2014/main" id="{AB8C311F-7253-4AED-9701-7FC0708C41C7}"/>
+              </a:ext>
+              <a:ext uri="{C183D7F6-B498-43B3-948B-1728B52AA6E4}">
+                <adec:decorative xmlns:adec="http://schemas.microsoft.com/office/drawing/2017/decorative" val="1"/>
+              </a:ext>
+            </a:extLst>
+          </p:cNvPr>
+          <p:cNvSpPr>
+            <a:spLocks noGrp="1" noRot="1" noChangeAspect="1" noMove="1" noResize="1" noEditPoints="1" noAdjustHandles="1" noChangeArrowheads="1" noChangeShapeType="1" noTextEdit="1"/>
+          </p:cNvSpPr>
+          <p:nvPr>
+            <p:extLst>
+              <p:ext uri="{386F3935-93C4-4BCD-93E2-E3B085C9AB24}">
+                <p16:designElem xmlns:p16="http://schemas.microsoft.com/office/powerpoint/2015/main" val="1"/>
+              </p:ext>
+            </p:extLst>
+          </p:nvPr>
+        </p:nvSpPr>
+        <p:spPr>
+          <a:xfrm>
+            <a:off x="0" y="0"/>
+            <a:ext cx="12192000" cy="6858000"/>
+          </a:xfrm>
+          <a:prstGeom prst="rect">
+            <a:avLst/>
+          </a:prstGeom>
+          <a:ln w="12700" cap="flat" cmpd="sng" algn="ctr">
+            <a:noFill/>
+            <a:prstDash val="solid"/>
+            <a:miter lim="800000"/>
+          </a:ln>
+          <a:effectLst/>
+          <a:extLst>
+            <a:ext uri="{91240B29-F687-4F45-9708-019B960494DF}">
+              <a14:hiddenLine xmlns:a14="http://schemas.microsoft.com/office/drawing/2010/main" w="12700" cap="flat" cmpd="sng" algn="ctr">
+                <a:solidFill>
+                  <a:schemeClr val="accent1">
+                    <a:shade val="50000"/>
+                  </a:schemeClr>
+                </a:solidFill>
+                <a:prstDash val="solid"/>
+                <a:miter lim="800000"/>
+              </a14:hiddenLine>
+            </a:ext>
+          </a:extLst>
+        </p:spPr>
+        <p:style>
+          <a:lnRef idx="2">
+            <a:schemeClr val="accent1">
+              <a:shade val="50000"/>
+            </a:schemeClr>
+          </a:lnRef>
+          <a:fillRef idx="1">
+            <a:schemeClr val="accent1"/>
+          </a:fillRef>
+          <a:effectRef idx="0">
+            <a:schemeClr val="accent1"/>
+          </a:effectRef>
+          <a:fontRef idx="minor">
+            <a:schemeClr val="lt1"/>
+          </a:fontRef>
+        </p:style>
+        <p:txBody>
+          <a:bodyPr rtlCol="0" anchor="ctr"/>
+          <a:lstStyle/>
+          <a:p>
+            <a:pPr algn="ctr"/>
+            <a:endParaRPr lang="en-US"/>
+          </a:p>
+        </p:txBody>
+      </p:sp>
+      <p:sp>
+        <p:nvSpPr>
+          <p:cNvPr id="11" name="Rectangle 10">
+            <a:extLst>
+              <a:ext uri="{FF2B5EF4-FFF2-40B4-BE49-F238E27FC236}">
+                <a16:creationId xmlns:a16="http://schemas.microsoft.com/office/drawing/2014/main" id="{E2384209-CB15-4CDF-9D31-C44FD9A3F20D}"/>
+              </a:ext>
+              <a:ext uri="{C183D7F6-B498-43B3-948B-1728B52AA6E4}">
+                <adec:decorative xmlns:adec="http://schemas.microsoft.com/office/drawing/2017/decorative" val="1"/>
+              </a:ext>
+            </a:extLst>
+          </p:cNvPr>
+          <p:cNvSpPr>
+            <a:spLocks noGrp="1" noRot="1" noChangeAspect="1" noMove="1" noResize="1" noEditPoints="1" noAdjustHandles="1" noChangeArrowheads="1" noChangeShapeType="1" noTextEdit="1"/>
+          </p:cNvSpPr>
+          <p:nvPr>
+            <p:extLst>
+              <p:ext uri="{386F3935-93C4-4BCD-93E2-E3B085C9AB24}">
+                <p16:designElem xmlns:p16="http://schemas.microsoft.com/office/powerpoint/2015/main" val="1"/>
+              </p:ext>
+            </p:extLst>
+          </p:nvPr>
+        </p:nvSpPr>
+        <p:spPr>
+          <a:xfrm rot="16200000" flipH="1">
+            <a:off x="2666617" y="-2666188"/>
+            <a:ext cx="6858000" cy="12191233"/>
+          </a:xfrm>
+          <a:prstGeom prst="rect">
+            <a:avLst/>
+          </a:prstGeom>
+          <a:gradFill>
+            <a:gsLst>
+              <a:gs pos="8000">
+                <a:schemeClr val="accent1"/>
+              </a:gs>
+              <a:gs pos="100000">
+                <a:schemeClr val="accent1">
+                  <a:lumMod val="50000"/>
+                </a:schemeClr>
+              </a:gs>
+            </a:gsLst>
+            <a:lin ang="12000000" scaled="0"/>
+          </a:gradFill>
+          <a:ln>
+            <a:noFill/>
+          </a:ln>
+        </p:spPr>
+        <p:style>
+          <a:lnRef idx="2">
+            <a:schemeClr val="accent1">
+              <a:shade val="50000"/>
+            </a:schemeClr>
+          </a:lnRef>
+          <a:fillRef idx="1">
+            <a:schemeClr val="accent1"/>
+          </a:fillRef>
+          <a:effectRef idx="0">
+            <a:schemeClr val="accent1"/>
+          </a:effectRef>
+          <a:fontRef idx="minor">
+            <a:schemeClr val="lt1"/>
+          </a:fontRef>
+        </p:style>
+        <p:txBody>
+          <a:bodyPr rtlCol="0" anchor="ctr"/>
+          <a:lstStyle/>
+          <a:p>
+            <a:pPr algn="ctr"/>
+            <a:endParaRPr lang="en-US"/>
+          </a:p>
+        </p:txBody>
+      </p:sp>
+      <p:sp>
+        <p:nvSpPr>
+          <p:cNvPr id="13" name="Rectangle 12">
+            <a:extLst>
+              <a:ext uri="{FF2B5EF4-FFF2-40B4-BE49-F238E27FC236}">
+                <a16:creationId xmlns:a16="http://schemas.microsoft.com/office/drawing/2014/main" id="{2633B3B5-CC90-43F0-8714-D31D1F3F0209}"/>
+              </a:ext>
+              <a:ext uri="{C183D7F6-B498-43B3-948B-1728B52AA6E4}">
+                <adec:decorative xmlns:adec="http://schemas.microsoft.com/office/drawing/2017/decorative" val="1"/>
+              </a:ext>
+            </a:extLst>
+          </p:cNvPr>
+          <p:cNvSpPr>
+            <a:spLocks noGrp="1" noRot="1" noChangeAspect="1" noMove="1" noResize="1" noEditPoints="1" noAdjustHandles="1" noChangeArrowheads="1" noChangeShapeType="1" noTextEdit="1"/>
+          </p:cNvSpPr>
+          <p:nvPr>
+            <p:extLst>
+              <p:ext uri="{386F3935-93C4-4BCD-93E2-E3B085C9AB24}">
+                <p16:designElem xmlns:p16="http://schemas.microsoft.com/office/powerpoint/2015/main" val="1"/>
+              </p:ext>
+            </p:extLst>
+          </p:nvPr>
+        </p:nvSpPr>
+        <p:spPr>
+          <a:xfrm rot="10800000" flipH="1">
+            <a:off x="-2311" y="0"/>
+            <a:ext cx="9070846" cy="6857572"/>
+          </a:xfrm>
+          <a:prstGeom prst="rect">
+            <a:avLst/>
+          </a:prstGeom>
+          <a:gradFill>
+            <a:gsLst>
+              <a:gs pos="8000">
+                <a:srgbClr val="000000">
+                  <a:alpha val="52000"/>
+                </a:srgbClr>
+              </a:gs>
+              <a:gs pos="100000">
+                <a:schemeClr val="accent1"/>
+              </a:gs>
+            </a:gsLst>
+            <a:lin ang="4800000" scaled="0"/>
+          </a:gradFill>
+          <a:ln>
+            <a:noFill/>
+          </a:ln>
+        </p:spPr>
+        <p:style>
+          <a:lnRef idx="2">
+            <a:schemeClr val="accent1">
+              <a:shade val="50000"/>
+            </a:schemeClr>
+          </a:lnRef>
+          <a:fillRef idx="1">
+            <a:schemeClr val="accent1"/>
+          </a:fillRef>
+          <a:effectRef idx="0">
+            <a:schemeClr val="accent1"/>
+          </a:effectRef>
+          <a:fontRef idx="minor">
+            <a:schemeClr val="lt1"/>
+          </a:fontRef>
+        </p:style>
+        <p:txBody>
+          <a:bodyPr rtlCol="0" anchor="ctr"/>
+          <a:lstStyle/>
+          <a:p>
+            <a:pPr algn="ctr"/>
+            <a:endParaRPr lang="en-US"/>
+          </a:p>
+        </p:txBody>
+      </p:sp>
+      <p:sp>
+        <p:nvSpPr>
+          <p:cNvPr id="15" name="Rectangle 14">
+            <a:extLst>
+              <a:ext uri="{FF2B5EF4-FFF2-40B4-BE49-F238E27FC236}">
+                <a16:creationId xmlns:a16="http://schemas.microsoft.com/office/drawing/2014/main" id="{A8D57A06-A426-446D-B02C-A2DC6B62E45E}"/>
+              </a:ext>
+              <a:ext uri="{C183D7F6-B498-43B3-948B-1728B52AA6E4}">
+                <adec:decorative xmlns:adec="http://schemas.microsoft.com/office/drawing/2017/decorative" val="1"/>
+              </a:ext>
+            </a:extLst>
+          </p:cNvPr>
+          <p:cNvSpPr>
+            <a:spLocks noGrp="1" noRot="1" noChangeAspect="1" noMove="1" noResize="1" noEditPoints="1" noAdjustHandles="1" noChangeArrowheads="1" noChangeShapeType="1" noTextEdit="1"/>
+          </p:cNvSpPr>
+          <p:nvPr>
+            <p:extLst>
+              <p:ext uri="{386F3935-93C4-4BCD-93E2-E3B085C9AB24}">
+                <p16:designElem xmlns:p16="http://schemas.microsoft.com/office/powerpoint/2015/main" val="1"/>
+              </p:ext>
+            </p:extLst>
+          </p:nvPr>
+        </p:nvSpPr>
+        <p:spPr>
+          <a:xfrm rot="16200000" flipH="1">
+            <a:off x="3649491" y="-1685840"/>
+            <a:ext cx="4894564" cy="12193546"/>
+          </a:xfrm>
+          <a:prstGeom prst="rect">
+            <a:avLst/>
+          </a:prstGeom>
+          <a:gradFill>
+            <a:gsLst>
+              <a:gs pos="0">
+                <a:schemeClr val="accent5">
+                  <a:lumMod val="60000"/>
+                  <a:lumOff val="40000"/>
+                  <a:alpha val="0"/>
+                </a:schemeClr>
+              </a:gs>
+              <a:gs pos="100000">
+                <a:srgbClr val="000000">
+                  <a:alpha val="46000"/>
+                </a:srgbClr>
+              </a:gs>
+            </a:gsLst>
+            <a:lin ang="1200000" scaled="0"/>
+          </a:gradFill>
+          <a:ln>
+            <a:noFill/>
+          </a:ln>
+        </p:spPr>
+        <p:style>
+          <a:lnRef idx="2">
+            <a:schemeClr val="accent1">
+              <a:shade val="50000"/>
+            </a:schemeClr>
+          </a:lnRef>
+          <a:fillRef idx="1">
+            <a:schemeClr val="accent1"/>
+          </a:fillRef>
+          <a:effectRef idx="0">
+            <a:schemeClr val="accent1"/>
+          </a:effectRef>
+          <a:fontRef idx="minor">
+            <a:schemeClr val="lt1"/>
+          </a:fontRef>
+        </p:style>
+        <p:txBody>
+          <a:bodyPr rtlCol="0" anchor="ctr"/>
+          <a:lstStyle/>
+          <a:p>
+            <a:pPr algn="ctr"/>
+            <a:endParaRPr lang="en-US"/>
+          </a:p>
+        </p:txBody>
+      </p:sp>
+      <p:pic>
+        <p:nvPicPr>
+          <p:cNvPr id="4" name="Picture 3" descr="A black rectangular object with white lines&#10;&#10;Description automatically generated">
+            <a:extLst>
+              <a:ext uri="{FF2B5EF4-FFF2-40B4-BE49-F238E27FC236}">
+                <a16:creationId xmlns:a16="http://schemas.microsoft.com/office/drawing/2014/main" id="{C9AC64C6-BCBD-1D8F-D4AB-E0137FEE8A33}"/>
+              </a:ext>
+            </a:extLst>
+          </p:cNvPr>
+          <p:cNvPicPr>
+            <a:picLocks noChangeAspect="1"/>
+          </p:cNvPicPr>
+          <p:nvPr/>
+        </p:nvPicPr>
+        <p:blipFill rotWithShape="1">
+          <a:blip r:embed="rId2"/>
+          <a:srcRect l="1333"/>
+          <a:stretch/>
+        </p:blipFill>
+        <p:spPr>
+          <a:xfrm>
+            <a:off x="457199" y="439841"/>
+            <a:ext cx="11277600" cy="5943600"/>
+          </a:xfrm>
+          <a:prstGeom prst="rect">
+            <a:avLst/>
+          </a:prstGeom>
+        </p:spPr>
+      </p:pic>
+      <p:sp>
+        <p:nvSpPr>
+          <p:cNvPr id="5" name="TextBox 4">
+            <a:extLst>
+              <a:ext uri="{FF2B5EF4-FFF2-40B4-BE49-F238E27FC236}">
+                <a16:creationId xmlns:a16="http://schemas.microsoft.com/office/drawing/2014/main" id="{278B3D24-2721-CCC6-002E-7DC4C56C61BD}"/>
+              </a:ext>
+            </a:extLst>
+          </p:cNvPr>
+          <p:cNvSpPr txBox="1"/>
+          <p:nvPr/>
+        </p:nvSpPr>
+        <p:spPr>
+          <a:xfrm>
+            <a:off x="457199" y="44149"/>
+            <a:ext cx="9257523" cy="461665"/>
+          </a:xfrm>
+          <a:prstGeom prst="rect">
+            <a:avLst/>
+          </a:prstGeom>
+          <a:noFill/>
+        </p:spPr>
+        <p:txBody>
+          <a:bodyPr wrap="square">
+            <a:spAutoFit/>
+          </a:bodyPr>
+          <a:lstStyle/>
+          <a:p>
+            <a:r>
+              <a:rPr lang="en-RO" sz="2400" b="1" i="1" u="sng" dirty="0">
+                <a:solidFill>
+                  <a:schemeClr val="bg1"/>
+                </a:solidFill>
+              </a:rPr>
+              <a:t>7. Metodele Statice: format()</a:t>
+            </a:r>
+            <a:endParaRPr lang="en-RO" sz="2400" dirty="0">
+              <a:solidFill>
+                <a:schemeClr val="bg1"/>
+              </a:solidFill>
+            </a:endParaRPr>
+          </a:p>
+        </p:txBody>
+      </p:sp>
+      <p:sp>
+        <p:nvSpPr>
+          <p:cNvPr id="10" name="TextBox 9">
+            <a:extLst>
+              <a:ext uri="{FF2B5EF4-FFF2-40B4-BE49-F238E27FC236}">
+                <a16:creationId xmlns:a16="http://schemas.microsoft.com/office/drawing/2014/main" id="{2E490398-DB41-4FAB-1B61-7CF3D35885A1}"/>
+              </a:ext>
+            </a:extLst>
+          </p:cNvPr>
+          <p:cNvSpPr txBox="1"/>
+          <p:nvPr/>
+        </p:nvSpPr>
+        <p:spPr>
+          <a:xfrm>
+            <a:off x="660067" y="778054"/>
+            <a:ext cx="9969818" cy="2585323"/>
+          </a:xfrm>
+          <a:prstGeom prst="rect">
+            <a:avLst/>
+          </a:prstGeom>
+          <a:noFill/>
+        </p:spPr>
+        <p:txBody>
+          <a:bodyPr wrap="square">
+            <a:spAutoFit/>
+          </a:bodyPr>
+          <a:lstStyle/>
+          <a:p>
+            <a:r>
+              <a:rPr lang="en-GB" b="0" i="0" dirty="0">
+                <a:solidFill>
+                  <a:srgbClr val="2E95D3"/>
+                </a:solidFill>
+                <a:effectLst/>
+                <a:highlight>
+                  <a:srgbClr val="0D0D0D"/>
+                </a:highlight>
+                <a:latin typeface="Söhne Mono"/>
+              </a:rPr>
+              <a:t>public</a:t>
+            </a:r>
+            <a:r>
+              <a:rPr lang="en-GB" b="0" i="0" dirty="0">
+                <a:solidFill>
+                  <a:srgbClr val="FFFFFF"/>
+                </a:solidFill>
+                <a:effectLst/>
+                <a:highlight>
+                  <a:srgbClr val="0D0D0D"/>
+                </a:highlight>
+                <a:latin typeface="Söhne Mono"/>
+              </a:rPr>
+              <a:t> </a:t>
+            </a:r>
+            <a:r>
+              <a:rPr lang="en-GB" b="0" i="0" dirty="0">
+                <a:solidFill>
+                  <a:srgbClr val="2E95D3"/>
+                </a:solidFill>
+                <a:effectLst/>
+                <a:highlight>
+                  <a:srgbClr val="0D0D0D"/>
+                </a:highlight>
+                <a:latin typeface="Söhne Mono"/>
+              </a:rPr>
+              <a:t>class</a:t>
+            </a:r>
+            <a:r>
+              <a:rPr lang="en-GB" b="0" i="0" dirty="0">
+                <a:solidFill>
+                  <a:srgbClr val="FFFFFF"/>
+                </a:solidFill>
+                <a:effectLst/>
+                <a:highlight>
+                  <a:srgbClr val="0D0D0D"/>
+                </a:highlight>
+                <a:latin typeface="Söhne Mono"/>
+              </a:rPr>
+              <a:t> </a:t>
+            </a:r>
+            <a:r>
+              <a:rPr lang="en-GB" b="0" i="0" dirty="0" err="1">
+                <a:solidFill>
+                  <a:srgbClr val="F22C3D"/>
+                </a:solidFill>
+                <a:effectLst/>
+                <a:highlight>
+                  <a:srgbClr val="0D0D0D"/>
+                </a:highlight>
+                <a:latin typeface="Söhne Mono"/>
+              </a:rPr>
+              <a:t>FormatExample</a:t>
+            </a:r>
+            <a:r>
+              <a:rPr lang="en-GB" b="0" i="0" dirty="0">
+                <a:solidFill>
+                  <a:srgbClr val="FFFFFF"/>
+                </a:solidFill>
+                <a:effectLst/>
+                <a:highlight>
+                  <a:srgbClr val="0D0D0D"/>
+                </a:highlight>
+                <a:latin typeface="Söhne Mono"/>
+              </a:rPr>
+              <a:t> { </a:t>
+            </a:r>
+          </a:p>
+          <a:p>
+            <a:r>
+              <a:rPr lang="en-GB" dirty="0">
+                <a:solidFill>
+                  <a:srgbClr val="FFFFFF"/>
+                </a:solidFill>
+                <a:highlight>
+                  <a:srgbClr val="0D0D0D"/>
+                </a:highlight>
+                <a:latin typeface="Söhne Mono"/>
+              </a:rPr>
+              <a:t>   </a:t>
+            </a:r>
+            <a:r>
+              <a:rPr lang="en-GB" b="0" i="0" dirty="0">
+                <a:solidFill>
+                  <a:srgbClr val="2E95D3"/>
+                </a:solidFill>
+                <a:effectLst/>
+                <a:highlight>
+                  <a:srgbClr val="0D0D0D"/>
+                </a:highlight>
+                <a:latin typeface="Söhne Mono"/>
+              </a:rPr>
+              <a:t>public</a:t>
+            </a:r>
+            <a:r>
+              <a:rPr lang="en-GB" b="0" i="0" dirty="0">
+                <a:solidFill>
+                  <a:srgbClr val="FFFFFF"/>
+                </a:solidFill>
+                <a:effectLst/>
+                <a:highlight>
+                  <a:srgbClr val="0D0D0D"/>
+                </a:highlight>
+                <a:latin typeface="Söhne Mono"/>
+              </a:rPr>
+              <a:t> </a:t>
+            </a:r>
+            <a:r>
+              <a:rPr lang="en-GB" b="0" i="0" dirty="0">
+                <a:solidFill>
+                  <a:srgbClr val="2E95D3"/>
+                </a:solidFill>
+                <a:effectLst/>
+                <a:highlight>
+                  <a:srgbClr val="0D0D0D"/>
+                </a:highlight>
+                <a:latin typeface="Söhne Mono"/>
+              </a:rPr>
+              <a:t>static</a:t>
+            </a:r>
+            <a:r>
+              <a:rPr lang="en-GB" b="0" i="0" dirty="0">
+                <a:solidFill>
+                  <a:srgbClr val="FFFFFF"/>
+                </a:solidFill>
+                <a:effectLst/>
+                <a:highlight>
+                  <a:srgbClr val="0D0D0D"/>
+                </a:highlight>
+                <a:latin typeface="Söhne Mono"/>
+              </a:rPr>
+              <a:t> </a:t>
+            </a:r>
+            <a:r>
+              <a:rPr lang="en-GB" b="0" i="0" dirty="0">
+                <a:solidFill>
+                  <a:srgbClr val="2E95D3"/>
+                </a:solidFill>
+                <a:effectLst/>
+                <a:highlight>
+                  <a:srgbClr val="0D0D0D"/>
+                </a:highlight>
+                <a:latin typeface="Söhne Mono"/>
+              </a:rPr>
+              <a:t>void</a:t>
+            </a:r>
+            <a:r>
+              <a:rPr lang="en-GB" b="0" i="0" dirty="0">
+                <a:solidFill>
+                  <a:srgbClr val="FFFFFF"/>
+                </a:solidFill>
+                <a:effectLst/>
+                <a:highlight>
+                  <a:srgbClr val="0D0D0D"/>
+                </a:highlight>
+                <a:latin typeface="Söhne Mono"/>
+              </a:rPr>
+              <a:t> </a:t>
+            </a:r>
+            <a:r>
+              <a:rPr lang="en-GB" b="0" i="0" dirty="0">
+                <a:solidFill>
+                  <a:srgbClr val="F22C3D"/>
+                </a:solidFill>
+                <a:effectLst/>
+                <a:highlight>
+                  <a:srgbClr val="0D0D0D"/>
+                </a:highlight>
+                <a:latin typeface="Söhne Mono"/>
+              </a:rPr>
+              <a:t>main</a:t>
+            </a:r>
+            <a:r>
+              <a:rPr lang="en-GB" b="0" i="0" dirty="0">
+                <a:solidFill>
+                  <a:srgbClr val="FFFFFF"/>
+                </a:solidFill>
+                <a:effectLst/>
+                <a:highlight>
+                  <a:srgbClr val="0D0D0D"/>
+                </a:highlight>
+                <a:latin typeface="Söhne Mono"/>
+              </a:rPr>
+              <a:t>(String[] </a:t>
+            </a:r>
+            <a:r>
+              <a:rPr lang="en-GB" b="0" i="0" dirty="0" err="1">
+                <a:solidFill>
+                  <a:srgbClr val="FFFFFF"/>
+                </a:solidFill>
+                <a:effectLst/>
+                <a:highlight>
+                  <a:srgbClr val="0D0D0D"/>
+                </a:highlight>
+                <a:latin typeface="Söhne Mono"/>
+              </a:rPr>
+              <a:t>args</a:t>
+            </a:r>
+            <a:r>
+              <a:rPr lang="en-GB" b="0" i="0" dirty="0">
+                <a:solidFill>
+                  <a:srgbClr val="FFFFFF"/>
+                </a:solidFill>
+                <a:effectLst/>
+                <a:highlight>
+                  <a:srgbClr val="0D0D0D"/>
+                </a:highlight>
+                <a:latin typeface="Söhne Mono"/>
+              </a:rPr>
+              <a:t>) { </a:t>
+            </a:r>
+          </a:p>
+          <a:p>
+            <a:r>
+              <a:rPr lang="en-GB" dirty="0">
+                <a:solidFill>
+                  <a:srgbClr val="FFFFFF"/>
+                </a:solidFill>
+                <a:highlight>
+                  <a:srgbClr val="0D0D0D"/>
+                </a:highlight>
+                <a:latin typeface="Söhne Mono"/>
+              </a:rPr>
+              <a:t>    </a:t>
+            </a:r>
+            <a:r>
+              <a:rPr lang="en-GB" b="0" i="0" dirty="0">
+                <a:solidFill>
+                  <a:srgbClr val="DF3079"/>
+                </a:solidFill>
+                <a:effectLst/>
+                <a:highlight>
+                  <a:srgbClr val="0D0D0D"/>
+                </a:highlight>
+                <a:latin typeface="Söhne Mono"/>
+              </a:rPr>
+              <a:t>String</a:t>
+            </a:r>
+            <a:r>
+              <a:rPr lang="en-GB" b="0" i="0" dirty="0">
+                <a:solidFill>
+                  <a:srgbClr val="FFFFFF"/>
+                </a:solidFill>
+                <a:effectLst/>
+                <a:highlight>
+                  <a:srgbClr val="0D0D0D"/>
+                </a:highlight>
+                <a:latin typeface="Söhne Mono"/>
+              </a:rPr>
+              <a:t> </a:t>
+            </a:r>
+            <a:r>
+              <a:rPr lang="en-GB" b="0" i="0" dirty="0">
+                <a:solidFill>
+                  <a:srgbClr val="DF3079"/>
+                </a:solidFill>
+                <a:effectLst/>
+                <a:highlight>
+                  <a:srgbClr val="0D0D0D"/>
+                </a:highlight>
+                <a:latin typeface="Söhne Mono"/>
+              </a:rPr>
+              <a:t>name</a:t>
+            </a:r>
+            <a:r>
+              <a:rPr lang="en-GB" b="0" i="0" dirty="0">
+                <a:solidFill>
+                  <a:srgbClr val="FFFFFF"/>
+                </a:solidFill>
+                <a:effectLst/>
+                <a:highlight>
+                  <a:srgbClr val="0D0D0D"/>
+                </a:highlight>
+                <a:latin typeface="Söhne Mono"/>
+              </a:rPr>
+              <a:t> = </a:t>
+            </a:r>
+            <a:r>
+              <a:rPr lang="en-GB" b="0" i="0" dirty="0">
+                <a:solidFill>
+                  <a:srgbClr val="00A67D"/>
+                </a:solidFill>
+                <a:effectLst/>
+                <a:highlight>
+                  <a:srgbClr val="0D0D0D"/>
+                </a:highlight>
+                <a:latin typeface="Söhne Mono"/>
+              </a:rPr>
+              <a:t>"Alice"</a:t>
+            </a:r>
+            <a:r>
+              <a:rPr lang="en-GB" b="0" i="0" dirty="0">
+                <a:solidFill>
+                  <a:srgbClr val="FFFFFF"/>
+                </a:solidFill>
+                <a:effectLst/>
+                <a:highlight>
+                  <a:srgbClr val="0D0D0D"/>
+                </a:highlight>
+                <a:latin typeface="Söhne Mono"/>
+              </a:rPr>
+              <a:t>; </a:t>
+            </a:r>
+            <a:r>
+              <a:rPr lang="en-GB" b="0" i="0" dirty="0">
+                <a:solidFill>
+                  <a:srgbClr val="DF3079"/>
+                </a:solidFill>
+                <a:effectLst/>
+                <a:highlight>
+                  <a:srgbClr val="0D0D0D"/>
+                </a:highlight>
+                <a:latin typeface="Söhne Mono"/>
+              </a:rPr>
+              <a:t>int</a:t>
+            </a:r>
+            <a:r>
+              <a:rPr lang="en-GB" b="0" i="0" dirty="0">
+                <a:solidFill>
+                  <a:srgbClr val="FFFFFF"/>
+                </a:solidFill>
+                <a:effectLst/>
+                <a:highlight>
+                  <a:srgbClr val="0D0D0D"/>
+                </a:highlight>
+                <a:latin typeface="Söhne Mono"/>
+              </a:rPr>
+              <a:t> </a:t>
+            </a:r>
+            <a:r>
+              <a:rPr lang="en-GB" b="0" i="0" dirty="0">
+                <a:solidFill>
+                  <a:srgbClr val="DF3079"/>
+                </a:solidFill>
+                <a:effectLst/>
+                <a:highlight>
+                  <a:srgbClr val="0D0D0D"/>
+                </a:highlight>
+                <a:latin typeface="Söhne Mono"/>
+              </a:rPr>
+              <a:t>age</a:t>
+            </a:r>
+            <a:r>
+              <a:rPr lang="en-GB" b="0" i="0" dirty="0">
+                <a:solidFill>
+                  <a:srgbClr val="FFFFFF"/>
+                </a:solidFill>
+                <a:effectLst/>
+                <a:highlight>
+                  <a:srgbClr val="0D0D0D"/>
+                </a:highlight>
+                <a:latin typeface="Söhne Mono"/>
+              </a:rPr>
+              <a:t> = </a:t>
+            </a:r>
+            <a:r>
+              <a:rPr lang="en-GB" b="0" i="0" dirty="0">
+                <a:solidFill>
+                  <a:srgbClr val="DF3079"/>
+                </a:solidFill>
+                <a:effectLst/>
+                <a:highlight>
+                  <a:srgbClr val="0D0D0D"/>
+                </a:highlight>
+                <a:latin typeface="Söhne Mono"/>
+              </a:rPr>
+              <a:t>30</a:t>
+            </a:r>
+            <a:r>
+              <a:rPr lang="en-GB" b="0" i="0" dirty="0">
+                <a:solidFill>
+                  <a:srgbClr val="FFFFFF"/>
+                </a:solidFill>
+                <a:effectLst/>
+                <a:highlight>
+                  <a:srgbClr val="0D0D0D"/>
+                </a:highlight>
+                <a:latin typeface="Söhne Mono"/>
+              </a:rPr>
+              <a:t>; </a:t>
+            </a:r>
+            <a:r>
+              <a:rPr lang="en-GB" b="0" i="0" dirty="0">
+                <a:solidFill>
+                  <a:srgbClr val="DF3079"/>
+                </a:solidFill>
+                <a:effectLst/>
+                <a:highlight>
+                  <a:srgbClr val="0D0D0D"/>
+                </a:highlight>
+                <a:latin typeface="Söhne Mono"/>
+              </a:rPr>
+              <a:t>double</a:t>
+            </a:r>
+            <a:r>
+              <a:rPr lang="en-GB" b="0" i="0" dirty="0">
+                <a:solidFill>
+                  <a:srgbClr val="FFFFFF"/>
+                </a:solidFill>
+                <a:effectLst/>
+                <a:highlight>
+                  <a:srgbClr val="0D0D0D"/>
+                </a:highlight>
+                <a:latin typeface="Söhne Mono"/>
+              </a:rPr>
+              <a:t> </a:t>
+            </a:r>
+            <a:r>
+              <a:rPr lang="en-GB" b="0" i="0" dirty="0">
+                <a:solidFill>
+                  <a:srgbClr val="DF3079"/>
+                </a:solidFill>
+                <a:effectLst/>
+                <a:highlight>
+                  <a:srgbClr val="0D0D0D"/>
+                </a:highlight>
+                <a:latin typeface="Söhne Mono"/>
+              </a:rPr>
+              <a:t>height</a:t>
+            </a:r>
+            <a:r>
+              <a:rPr lang="en-GB" b="0" i="0" dirty="0">
+                <a:solidFill>
+                  <a:srgbClr val="FFFFFF"/>
+                </a:solidFill>
+                <a:effectLst/>
+                <a:highlight>
+                  <a:srgbClr val="0D0D0D"/>
+                </a:highlight>
+                <a:latin typeface="Söhne Mono"/>
+              </a:rPr>
+              <a:t> = </a:t>
+            </a:r>
+            <a:r>
+              <a:rPr lang="en-GB" b="0" i="0" dirty="0">
+                <a:solidFill>
+                  <a:srgbClr val="DF3079"/>
+                </a:solidFill>
+                <a:effectLst/>
+                <a:highlight>
+                  <a:srgbClr val="0D0D0D"/>
+                </a:highlight>
+                <a:latin typeface="Söhne Mono"/>
+              </a:rPr>
+              <a:t>1.75</a:t>
+            </a:r>
+            <a:r>
+              <a:rPr lang="en-GB" b="0" i="0" dirty="0">
+                <a:solidFill>
+                  <a:schemeClr val="bg1"/>
+                </a:solidFill>
+                <a:effectLst/>
+                <a:highlight>
+                  <a:srgbClr val="0D0D0D"/>
+                </a:highlight>
+                <a:latin typeface="Söhne Mono"/>
+              </a:rPr>
+              <a:t>; </a:t>
+            </a:r>
+          </a:p>
+          <a:p>
+            <a:r>
+              <a:rPr lang="en-GB" dirty="0">
+                <a:solidFill>
+                  <a:schemeClr val="bg1"/>
+                </a:solidFill>
+                <a:highlight>
+                  <a:srgbClr val="0D0D0D"/>
+                </a:highlight>
+                <a:latin typeface="Söhne Mono"/>
+              </a:rPr>
+              <a:t>   </a:t>
+            </a:r>
+            <a:r>
+              <a:rPr lang="en-GB" b="0" i="0" dirty="0">
+                <a:solidFill>
+                  <a:schemeClr val="bg1"/>
+                </a:solidFill>
+                <a:effectLst/>
+                <a:highlight>
+                  <a:srgbClr val="0D0D0D"/>
+                </a:highlight>
+                <a:latin typeface="Söhne Mono"/>
+              </a:rPr>
+              <a:t>// Formatting the string using format() </a:t>
+            </a:r>
+          </a:p>
+          <a:p>
+            <a:r>
+              <a:rPr lang="en-GB" dirty="0">
+                <a:solidFill>
+                  <a:schemeClr val="bg1"/>
+                </a:solidFill>
+                <a:highlight>
+                  <a:srgbClr val="0D0D0D"/>
+                </a:highlight>
+                <a:latin typeface="Söhne Mono"/>
+              </a:rPr>
+              <a:t>    </a:t>
+            </a:r>
+            <a:r>
+              <a:rPr lang="en-GB" b="0" i="0" dirty="0">
+                <a:solidFill>
+                  <a:srgbClr val="DF3079"/>
+                </a:solidFill>
+                <a:effectLst/>
+                <a:highlight>
+                  <a:srgbClr val="0D0D0D"/>
+                </a:highlight>
+                <a:latin typeface="Söhne Mono"/>
+              </a:rPr>
+              <a:t>String</a:t>
+            </a:r>
+            <a:r>
+              <a:rPr lang="en-GB" b="0" i="0" dirty="0">
+                <a:solidFill>
+                  <a:srgbClr val="FFFFFF"/>
+                </a:solidFill>
+                <a:effectLst/>
+                <a:highlight>
+                  <a:srgbClr val="0D0D0D"/>
+                </a:highlight>
+                <a:latin typeface="Söhne Mono"/>
+              </a:rPr>
+              <a:t>    </a:t>
+            </a:r>
+            <a:r>
+              <a:rPr lang="en-GB" b="0" i="0" dirty="0" err="1">
+                <a:solidFill>
+                  <a:srgbClr val="DF3079"/>
+                </a:solidFill>
+                <a:effectLst/>
+                <a:highlight>
+                  <a:srgbClr val="0D0D0D"/>
+                </a:highlight>
+                <a:latin typeface="Söhne Mono"/>
+              </a:rPr>
+              <a:t>formattedString</a:t>
+            </a:r>
+            <a:r>
+              <a:rPr lang="en-GB" b="0" i="0" dirty="0">
+                <a:solidFill>
+                  <a:srgbClr val="FFFFFF"/>
+                </a:solidFill>
+                <a:effectLst/>
+                <a:highlight>
+                  <a:srgbClr val="0D0D0D"/>
+                </a:highlight>
+                <a:latin typeface="Söhne Mono"/>
+              </a:rPr>
+              <a:t> = </a:t>
+            </a:r>
+            <a:r>
+              <a:rPr lang="en-GB" b="0" i="0" dirty="0" err="1">
+                <a:solidFill>
+                  <a:srgbClr val="FFFFFF"/>
+                </a:solidFill>
+                <a:effectLst/>
+                <a:highlight>
+                  <a:srgbClr val="0D0D0D"/>
+                </a:highlight>
+                <a:latin typeface="Söhne Mono"/>
+              </a:rPr>
+              <a:t>String.format</a:t>
+            </a:r>
+            <a:r>
+              <a:rPr lang="en-GB" b="0" i="0" dirty="0">
+                <a:solidFill>
+                  <a:srgbClr val="FFFFFF"/>
+                </a:solidFill>
+                <a:effectLst/>
+                <a:highlight>
+                  <a:srgbClr val="0D0D0D"/>
+                </a:highlight>
+                <a:latin typeface="Söhne Mono"/>
+              </a:rPr>
+              <a:t>(</a:t>
+            </a:r>
+            <a:r>
+              <a:rPr lang="en-GB" b="0" i="0" dirty="0">
+                <a:solidFill>
+                  <a:srgbClr val="00A67D"/>
+                </a:solidFill>
+                <a:effectLst/>
+                <a:highlight>
+                  <a:srgbClr val="0D0D0D"/>
+                </a:highlight>
+                <a:latin typeface="Söhne Mono"/>
+              </a:rPr>
+              <a:t>"Name: %s, Age: %d, Height: %.2f meters"</a:t>
+            </a:r>
+            <a:r>
+              <a:rPr lang="en-GB" b="0" i="0" dirty="0">
+                <a:solidFill>
+                  <a:srgbClr val="FFFFFF"/>
+                </a:solidFill>
+                <a:effectLst/>
+                <a:highlight>
+                  <a:srgbClr val="0D0D0D"/>
+                </a:highlight>
+                <a:latin typeface="Söhne Mono"/>
+              </a:rPr>
+              <a:t>, name, age, height); </a:t>
+            </a:r>
+            <a:r>
+              <a:rPr lang="en-GB" b="0" i="0" dirty="0">
+                <a:solidFill>
+                  <a:schemeClr val="bg1"/>
+                </a:solidFill>
+                <a:effectLst/>
+                <a:highlight>
+                  <a:srgbClr val="0D0D0D"/>
+                </a:highlight>
+                <a:latin typeface="Söhne Mono"/>
+              </a:rPr>
+              <a:t>// Displaying the formatted string </a:t>
+            </a:r>
+          </a:p>
+          <a:p>
+            <a:r>
+              <a:rPr lang="en-GB" b="0" i="0" dirty="0" err="1">
+                <a:solidFill>
+                  <a:srgbClr val="FFFFFF"/>
+                </a:solidFill>
+                <a:effectLst/>
+                <a:highlight>
+                  <a:srgbClr val="0D0D0D"/>
+                </a:highlight>
+                <a:latin typeface="Söhne Mono"/>
+              </a:rPr>
+              <a:t>System.out.println</a:t>
+            </a:r>
+            <a:r>
+              <a:rPr lang="en-GB" b="0" i="0" dirty="0">
+                <a:solidFill>
+                  <a:srgbClr val="FFFFFF"/>
+                </a:solidFill>
+                <a:effectLst/>
+                <a:highlight>
+                  <a:srgbClr val="0D0D0D"/>
+                </a:highlight>
+                <a:latin typeface="Söhne Mono"/>
+              </a:rPr>
+              <a:t>(</a:t>
+            </a:r>
+            <a:r>
+              <a:rPr lang="en-GB" b="0" i="0" dirty="0">
+                <a:solidFill>
+                  <a:srgbClr val="00A67D"/>
+                </a:solidFill>
+                <a:effectLst/>
+                <a:highlight>
+                  <a:srgbClr val="0D0D0D"/>
+                </a:highlight>
+                <a:latin typeface="Söhne Mono"/>
+              </a:rPr>
+              <a:t>"Formatted string: "</a:t>
+            </a:r>
+            <a:r>
+              <a:rPr lang="en-GB" b="0" i="0" dirty="0">
+                <a:solidFill>
+                  <a:srgbClr val="FFFFFF"/>
+                </a:solidFill>
+                <a:effectLst/>
+                <a:highlight>
+                  <a:srgbClr val="0D0D0D"/>
+                </a:highlight>
+                <a:latin typeface="Söhne Mono"/>
+              </a:rPr>
+              <a:t> + </a:t>
+            </a:r>
+            <a:r>
+              <a:rPr lang="en-GB" b="0" i="0" dirty="0" err="1">
+                <a:solidFill>
+                  <a:srgbClr val="FFFFFF"/>
+                </a:solidFill>
+                <a:effectLst/>
+                <a:highlight>
+                  <a:srgbClr val="0D0D0D"/>
+                </a:highlight>
+                <a:latin typeface="Söhne Mono"/>
+              </a:rPr>
+              <a:t>formattedString</a:t>
+            </a:r>
+            <a:r>
+              <a:rPr lang="en-GB" b="0" i="0" dirty="0">
+                <a:solidFill>
+                  <a:srgbClr val="FFFFFF"/>
+                </a:solidFill>
+                <a:effectLst/>
+                <a:highlight>
+                  <a:srgbClr val="0D0D0D"/>
+                </a:highlight>
+                <a:latin typeface="Söhne Mono"/>
+              </a:rPr>
+              <a:t>); </a:t>
+            </a:r>
+          </a:p>
+          <a:p>
+            <a:r>
+              <a:rPr lang="en-GB" dirty="0">
+                <a:solidFill>
+                  <a:srgbClr val="FFFFFF"/>
+                </a:solidFill>
+                <a:highlight>
+                  <a:srgbClr val="0D0D0D"/>
+                </a:highlight>
+                <a:latin typeface="Söhne Mono"/>
+              </a:rPr>
+              <a:t>   </a:t>
+            </a:r>
+            <a:r>
+              <a:rPr lang="en-GB" b="0" i="0" dirty="0">
+                <a:solidFill>
+                  <a:srgbClr val="FFFFFF"/>
+                </a:solidFill>
+                <a:effectLst/>
+                <a:highlight>
+                  <a:srgbClr val="0D0D0D"/>
+                </a:highlight>
+                <a:latin typeface="Söhne Mono"/>
+              </a:rPr>
+              <a:t>} </a:t>
+            </a:r>
+          </a:p>
+          <a:p>
+            <a:r>
+              <a:rPr lang="en-GB" b="0" i="0" dirty="0">
+                <a:solidFill>
+                  <a:srgbClr val="FFFFFF"/>
+                </a:solidFill>
+                <a:effectLst/>
+                <a:highlight>
+                  <a:srgbClr val="0D0D0D"/>
+                </a:highlight>
+                <a:latin typeface="Söhne Mono"/>
+              </a:rPr>
+              <a:t>}</a:t>
+            </a:r>
+            <a:endParaRPr lang="en-RO" dirty="0"/>
+          </a:p>
+        </p:txBody>
+      </p:sp>
+      <p:pic>
+        <p:nvPicPr>
+          <p:cNvPr id="2" name="Picture 1">
+            <a:extLst>
+              <a:ext uri="{FF2B5EF4-FFF2-40B4-BE49-F238E27FC236}">
+                <a16:creationId xmlns:a16="http://schemas.microsoft.com/office/drawing/2014/main" id="{9BD87167-322F-CF66-40C7-11754126BB75}"/>
+              </a:ext>
+            </a:extLst>
+          </p:cNvPr>
+          <p:cNvPicPr>
+            <a:picLocks noChangeAspect="1"/>
+          </p:cNvPicPr>
+          <p:nvPr/>
+        </p:nvPicPr>
+        <p:blipFill>
+          <a:blip r:embed="rId3"/>
+          <a:stretch>
+            <a:fillRect/>
+          </a:stretch>
+        </p:blipFill>
+        <p:spPr>
+          <a:xfrm>
+            <a:off x="979572" y="3943112"/>
+            <a:ext cx="8763396" cy="702040"/>
+          </a:xfrm>
+          <a:prstGeom prst="rect">
+            <a:avLst/>
+          </a:prstGeom>
+        </p:spPr>
+      </p:pic>
+    </p:spTree>
+    <p:extLst>
+      <p:ext uri="{BB962C8B-B14F-4D97-AF65-F5344CB8AC3E}">
+        <p14:creationId xmlns:p14="http://schemas.microsoft.com/office/powerpoint/2010/main" val="3980534199"/>
+      </p:ext>
+    </p:extLst>
+  </p:cSld>
+  <p:clrMapOvr>
+    <a:masterClrMapping/>
+  </p:clrMapOvr>
+</p:sld>
+</file>
+
+<file path=ppt/slides/slide18.xml><?xml version="1.0" encoding="utf-8"?>
+<p:sld xmlns:a="http://schemas.openxmlformats.org/drawingml/2006/main" xmlns:r="http://schemas.openxmlformats.org/officeDocument/2006/relationships" xmlns:p="http://schemas.openxmlformats.org/presentationml/2006/main">
+  <p:cSld>
+    <p:bg>
+      <p:bgPr>
+        <a:solidFill>
+          <a:schemeClr val="bg1"/>
+        </a:solidFill>
+        <a:effectLst/>
+      </p:bgPr>
+    </p:bg>
+    <p:spTree>
+      <p:nvGrpSpPr>
+        <p:cNvPr id="1" name=""/>
+        <p:cNvGrpSpPr/>
+        <p:nvPr/>
+      </p:nvGrpSpPr>
+      <p:grpSpPr>
+        <a:xfrm>
+          <a:off x="0" y="0"/>
+          <a:ext cx="0" cy="0"/>
+          <a:chOff x="0" y="0"/>
+          <a:chExt cx="0" cy="0"/>
+        </a:xfrm>
+      </p:grpSpPr>
+      <p:sp useBgFill="1">
+        <p:nvSpPr>
+          <p:cNvPr id="9" name="Rectangle 8">
+            <a:extLst>
+              <a:ext uri="{FF2B5EF4-FFF2-40B4-BE49-F238E27FC236}">
+                <a16:creationId xmlns:a16="http://schemas.microsoft.com/office/drawing/2014/main" id="{AB8C311F-7253-4AED-9701-7FC0708C41C7}"/>
+              </a:ext>
+              <a:ext uri="{C183D7F6-B498-43B3-948B-1728B52AA6E4}">
+                <adec:decorative xmlns:adec="http://schemas.microsoft.com/office/drawing/2017/decorative" val="1"/>
+              </a:ext>
+            </a:extLst>
+          </p:cNvPr>
+          <p:cNvSpPr>
+            <a:spLocks noGrp="1" noRot="1" noChangeAspect="1" noMove="1" noResize="1" noEditPoints="1" noAdjustHandles="1" noChangeArrowheads="1" noChangeShapeType="1" noTextEdit="1"/>
+          </p:cNvSpPr>
+          <p:nvPr>
+            <p:extLst>
+              <p:ext uri="{386F3935-93C4-4BCD-93E2-E3B085C9AB24}">
+                <p16:designElem xmlns:p16="http://schemas.microsoft.com/office/powerpoint/2015/main" val="1"/>
+              </p:ext>
+            </p:extLst>
+          </p:nvPr>
+        </p:nvSpPr>
+        <p:spPr>
+          <a:xfrm>
+            <a:off x="0" y="0"/>
+            <a:ext cx="12192000" cy="6858000"/>
+          </a:xfrm>
+          <a:prstGeom prst="rect">
+            <a:avLst/>
+          </a:prstGeom>
+          <a:ln w="12700" cap="flat" cmpd="sng" algn="ctr">
+            <a:noFill/>
+            <a:prstDash val="solid"/>
+            <a:miter lim="800000"/>
+          </a:ln>
+          <a:effectLst/>
+          <a:extLst>
+            <a:ext uri="{91240B29-F687-4F45-9708-019B960494DF}">
+              <a14:hiddenLine xmlns:a14="http://schemas.microsoft.com/office/drawing/2010/main" w="12700" cap="flat" cmpd="sng" algn="ctr">
+                <a:solidFill>
+                  <a:schemeClr val="accent1">
+                    <a:shade val="50000"/>
+                  </a:schemeClr>
+                </a:solidFill>
+                <a:prstDash val="solid"/>
+                <a:miter lim="800000"/>
+              </a14:hiddenLine>
+            </a:ext>
+          </a:extLst>
+        </p:spPr>
+        <p:style>
+          <a:lnRef idx="2">
+            <a:schemeClr val="accent1">
+              <a:shade val="50000"/>
+            </a:schemeClr>
+          </a:lnRef>
+          <a:fillRef idx="1">
+            <a:schemeClr val="accent1"/>
+          </a:fillRef>
+          <a:effectRef idx="0">
+            <a:schemeClr val="accent1"/>
+          </a:effectRef>
+          <a:fontRef idx="minor">
+            <a:schemeClr val="lt1"/>
+          </a:fontRef>
+        </p:style>
+        <p:txBody>
+          <a:bodyPr rtlCol="0" anchor="ctr"/>
+          <a:lstStyle/>
+          <a:p>
+            <a:pPr algn="ctr"/>
+            <a:endParaRPr lang="en-US"/>
+          </a:p>
+        </p:txBody>
+      </p:sp>
+      <p:sp>
+        <p:nvSpPr>
+          <p:cNvPr id="11" name="Rectangle 10">
+            <a:extLst>
+              <a:ext uri="{FF2B5EF4-FFF2-40B4-BE49-F238E27FC236}">
+                <a16:creationId xmlns:a16="http://schemas.microsoft.com/office/drawing/2014/main" id="{E2384209-CB15-4CDF-9D31-C44FD9A3F20D}"/>
+              </a:ext>
+              <a:ext uri="{C183D7F6-B498-43B3-948B-1728B52AA6E4}">
+                <adec:decorative xmlns:adec="http://schemas.microsoft.com/office/drawing/2017/decorative" val="1"/>
+              </a:ext>
+            </a:extLst>
+          </p:cNvPr>
+          <p:cNvSpPr>
+            <a:spLocks noGrp="1" noRot="1" noChangeAspect="1" noMove="1" noResize="1" noEditPoints="1" noAdjustHandles="1" noChangeArrowheads="1" noChangeShapeType="1" noTextEdit="1"/>
+          </p:cNvSpPr>
+          <p:nvPr>
+            <p:extLst>
+              <p:ext uri="{386F3935-93C4-4BCD-93E2-E3B085C9AB24}">
+                <p16:designElem xmlns:p16="http://schemas.microsoft.com/office/powerpoint/2015/main" val="1"/>
+              </p:ext>
+            </p:extLst>
+          </p:nvPr>
+        </p:nvSpPr>
+        <p:spPr>
+          <a:xfrm rot="16200000" flipH="1">
+            <a:off x="2666617" y="-2666188"/>
+            <a:ext cx="6858000" cy="12191233"/>
+          </a:xfrm>
+          <a:prstGeom prst="rect">
+            <a:avLst/>
+          </a:prstGeom>
+          <a:gradFill>
+            <a:gsLst>
+              <a:gs pos="8000">
+                <a:schemeClr val="accent1"/>
+              </a:gs>
+              <a:gs pos="100000">
+                <a:schemeClr val="accent1">
+                  <a:lumMod val="50000"/>
+                </a:schemeClr>
+              </a:gs>
+            </a:gsLst>
+            <a:lin ang="12000000" scaled="0"/>
+          </a:gradFill>
+          <a:ln>
+            <a:noFill/>
+          </a:ln>
+        </p:spPr>
+        <p:style>
+          <a:lnRef idx="2">
+            <a:schemeClr val="accent1">
+              <a:shade val="50000"/>
+            </a:schemeClr>
+          </a:lnRef>
+          <a:fillRef idx="1">
+            <a:schemeClr val="accent1"/>
+          </a:fillRef>
+          <a:effectRef idx="0">
+            <a:schemeClr val="accent1"/>
+          </a:effectRef>
+          <a:fontRef idx="minor">
+            <a:schemeClr val="lt1"/>
+          </a:fontRef>
+        </p:style>
+        <p:txBody>
+          <a:bodyPr rtlCol="0" anchor="ctr"/>
+          <a:lstStyle/>
+          <a:p>
+            <a:pPr algn="ctr"/>
+            <a:endParaRPr lang="en-US"/>
+          </a:p>
+        </p:txBody>
+      </p:sp>
+      <p:sp>
+        <p:nvSpPr>
+          <p:cNvPr id="13" name="Rectangle 12">
+            <a:extLst>
+              <a:ext uri="{FF2B5EF4-FFF2-40B4-BE49-F238E27FC236}">
+                <a16:creationId xmlns:a16="http://schemas.microsoft.com/office/drawing/2014/main" id="{2633B3B5-CC90-43F0-8714-D31D1F3F0209}"/>
+              </a:ext>
+              <a:ext uri="{C183D7F6-B498-43B3-948B-1728B52AA6E4}">
+                <adec:decorative xmlns:adec="http://schemas.microsoft.com/office/drawing/2017/decorative" val="1"/>
+              </a:ext>
+            </a:extLst>
+          </p:cNvPr>
+          <p:cNvSpPr>
+            <a:spLocks noGrp="1" noRot="1" noChangeAspect="1" noMove="1" noResize="1" noEditPoints="1" noAdjustHandles="1" noChangeArrowheads="1" noChangeShapeType="1" noTextEdit="1"/>
+          </p:cNvSpPr>
+          <p:nvPr>
+            <p:extLst>
+              <p:ext uri="{386F3935-93C4-4BCD-93E2-E3B085C9AB24}">
+                <p16:designElem xmlns:p16="http://schemas.microsoft.com/office/powerpoint/2015/main" val="1"/>
+              </p:ext>
+            </p:extLst>
+          </p:nvPr>
+        </p:nvSpPr>
+        <p:spPr>
+          <a:xfrm rot="10800000" flipH="1">
+            <a:off x="-2311" y="0"/>
+            <a:ext cx="9070846" cy="6857572"/>
+          </a:xfrm>
+          <a:prstGeom prst="rect">
+            <a:avLst/>
+          </a:prstGeom>
+          <a:gradFill>
+            <a:gsLst>
+              <a:gs pos="8000">
+                <a:srgbClr val="000000">
+                  <a:alpha val="52000"/>
+                </a:srgbClr>
+              </a:gs>
+              <a:gs pos="100000">
+                <a:schemeClr val="accent1"/>
+              </a:gs>
+            </a:gsLst>
+            <a:lin ang="4800000" scaled="0"/>
+          </a:gradFill>
+          <a:ln>
+            <a:noFill/>
+          </a:ln>
+        </p:spPr>
+        <p:style>
+          <a:lnRef idx="2">
+            <a:schemeClr val="accent1">
+              <a:shade val="50000"/>
+            </a:schemeClr>
+          </a:lnRef>
+          <a:fillRef idx="1">
+            <a:schemeClr val="accent1"/>
+          </a:fillRef>
+          <a:effectRef idx="0">
+            <a:schemeClr val="accent1"/>
+          </a:effectRef>
+          <a:fontRef idx="minor">
+            <a:schemeClr val="lt1"/>
+          </a:fontRef>
+        </p:style>
+        <p:txBody>
+          <a:bodyPr rtlCol="0" anchor="ctr"/>
+          <a:lstStyle/>
+          <a:p>
+            <a:pPr algn="ctr"/>
+            <a:endParaRPr lang="en-US"/>
+          </a:p>
+        </p:txBody>
+      </p:sp>
+      <p:sp>
+        <p:nvSpPr>
+          <p:cNvPr id="15" name="Rectangle 14">
+            <a:extLst>
+              <a:ext uri="{FF2B5EF4-FFF2-40B4-BE49-F238E27FC236}">
+                <a16:creationId xmlns:a16="http://schemas.microsoft.com/office/drawing/2014/main" id="{A8D57A06-A426-446D-B02C-A2DC6B62E45E}"/>
+              </a:ext>
+              <a:ext uri="{C183D7F6-B498-43B3-948B-1728B52AA6E4}">
+                <adec:decorative xmlns:adec="http://schemas.microsoft.com/office/drawing/2017/decorative" val="1"/>
+              </a:ext>
+            </a:extLst>
+          </p:cNvPr>
+          <p:cNvSpPr>
+            <a:spLocks noGrp="1" noRot="1" noChangeAspect="1" noMove="1" noResize="1" noEditPoints="1" noAdjustHandles="1" noChangeArrowheads="1" noChangeShapeType="1" noTextEdit="1"/>
+          </p:cNvSpPr>
+          <p:nvPr>
+            <p:extLst>
+              <p:ext uri="{386F3935-93C4-4BCD-93E2-E3B085C9AB24}">
+                <p16:designElem xmlns:p16="http://schemas.microsoft.com/office/powerpoint/2015/main" val="1"/>
+              </p:ext>
+            </p:extLst>
+          </p:nvPr>
+        </p:nvSpPr>
+        <p:spPr>
+          <a:xfrm rot="16200000" flipH="1">
+            <a:off x="3649491" y="-1685840"/>
+            <a:ext cx="4894564" cy="12193546"/>
+          </a:xfrm>
+          <a:prstGeom prst="rect">
+            <a:avLst/>
+          </a:prstGeom>
+          <a:gradFill>
+            <a:gsLst>
+              <a:gs pos="0">
+                <a:schemeClr val="accent5">
+                  <a:lumMod val="60000"/>
+                  <a:lumOff val="40000"/>
+                  <a:alpha val="0"/>
+                </a:schemeClr>
+              </a:gs>
+              <a:gs pos="100000">
+                <a:srgbClr val="000000">
+                  <a:alpha val="46000"/>
+                </a:srgbClr>
+              </a:gs>
+            </a:gsLst>
+            <a:lin ang="1200000" scaled="0"/>
+          </a:gradFill>
+          <a:ln>
+            <a:noFill/>
+          </a:ln>
+        </p:spPr>
+        <p:style>
+          <a:lnRef idx="2">
+            <a:schemeClr val="accent1">
+              <a:shade val="50000"/>
+            </a:schemeClr>
+          </a:lnRef>
+          <a:fillRef idx="1">
+            <a:schemeClr val="accent1"/>
+          </a:fillRef>
+          <a:effectRef idx="0">
+            <a:schemeClr val="accent1"/>
+          </a:effectRef>
+          <a:fontRef idx="minor">
+            <a:schemeClr val="lt1"/>
+          </a:fontRef>
+        </p:style>
+        <p:txBody>
+          <a:bodyPr rtlCol="0" anchor="ctr"/>
+          <a:lstStyle/>
+          <a:p>
+            <a:pPr algn="ctr"/>
+            <a:endParaRPr lang="en-US"/>
+          </a:p>
+        </p:txBody>
+      </p:sp>
+      <p:pic>
+        <p:nvPicPr>
+          <p:cNvPr id="4" name="Picture 3" descr="A black rectangular object with white lines&#10;&#10;Description automatically generated">
+            <a:extLst>
+              <a:ext uri="{FF2B5EF4-FFF2-40B4-BE49-F238E27FC236}">
+                <a16:creationId xmlns:a16="http://schemas.microsoft.com/office/drawing/2014/main" id="{C9AC64C6-BCBD-1D8F-D4AB-E0137FEE8A33}"/>
+              </a:ext>
+            </a:extLst>
+          </p:cNvPr>
+          <p:cNvPicPr>
+            <a:picLocks noChangeAspect="1"/>
+          </p:cNvPicPr>
+          <p:nvPr/>
+        </p:nvPicPr>
+        <p:blipFill rotWithShape="1">
+          <a:blip r:embed="rId2"/>
+          <a:srcRect l="1333"/>
+          <a:stretch/>
+        </p:blipFill>
+        <p:spPr>
+          <a:xfrm>
+            <a:off x="457199" y="439841"/>
+            <a:ext cx="11277600" cy="5943600"/>
+          </a:xfrm>
+          <a:prstGeom prst="rect">
+            <a:avLst/>
+          </a:prstGeom>
+        </p:spPr>
+      </p:pic>
+      <p:sp>
+        <p:nvSpPr>
+          <p:cNvPr id="5" name="TextBox 4">
+            <a:extLst>
+              <a:ext uri="{FF2B5EF4-FFF2-40B4-BE49-F238E27FC236}">
+                <a16:creationId xmlns:a16="http://schemas.microsoft.com/office/drawing/2014/main" id="{278B3D24-2721-CCC6-002E-7DC4C56C61BD}"/>
+              </a:ext>
+            </a:extLst>
+          </p:cNvPr>
+          <p:cNvSpPr txBox="1"/>
+          <p:nvPr/>
+        </p:nvSpPr>
+        <p:spPr>
+          <a:xfrm>
+            <a:off x="457199" y="44149"/>
+            <a:ext cx="9257523" cy="461665"/>
+          </a:xfrm>
+          <a:prstGeom prst="rect">
+            <a:avLst/>
+          </a:prstGeom>
+          <a:noFill/>
+        </p:spPr>
+        <p:txBody>
+          <a:bodyPr wrap="square">
+            <a:spAutoFit/>
+          </a:bodyPr>
+          <a:lstStyle/>
+          <a:p>
+            <a:r>
+              <a:rPr lang="en-RO" sz="2400" b="1" i="1" u="sng" dirty="0">
+                <a:solidFill>
+                  <a:schemeClr val="bg1"/>
+                </a:solidFill>
+              </a:rPr>
+              <a:t>7. Metodele Statice: copyValueOf()</a:t>
+            </a:r>
+            <a:endParaRPr lang="en-RO" sz="2400" dirty="0">
+              <a:solidFill>
+                <a:schemeClr val="bg1"/>
+              </a:solidFill>
+            </a:endParaRPr>
+          </a:p>
+        </p:txBody>
+      </p:sp>
+      <p:sp>
+        <p:nvSpPr>
+          <p:cNvPr id="10" name="TextBox 9">
+            <a:extLst>
+              <a:ext uri="{FF2B5EF4-FFF2-40B4-BE49-F238E27FC236}">
+                <a16:creationId xmlns:a16="http://schemas.microsoft.com/office/drawing/2014/main" id="{2E490398-DB41-4FAB-1B61-7CF3D35885A1}"/>
+              </a:ext>
+            </a:extLst>
+          </p:cNvPr>
+          <p:cNvSpPr txBox="1"/>
+          <p:nvPr/>
+        </p:nvSpPr>
+        <p:spPr>
+          <a:xfrm>
+            <a:off x="660067" y="778054"/>
+            <a:ext cx="9969818" cy="3416320"/>
+          </a:xfrm>
+          <a:prstGeom prst="rect">
+            <a:avLst/>
+          </a:prstGeom>
+          <a:noFill/>
+        </p:spPr>
+        <p:txBody>
+          <a:bodyPr wrap="square">
+            <a:spAutoFit/>
+          </a:bodyPr>
+          <a:lstStyle/>
+          <a:p>
+            <a:r>
+              <a:rPr lang="en-GB" b="0" i="0" dirty="0">
+                <a:solidFill>
+                  <a:srgbClr val="2E95D3"/>
+                </a:solidFill>
+                <a:effectLst/>
+                <a:highlight>
+                  <a:srgbClr val="0D0D0D"/>
+                </a:highlight>
+                <a:latin typeface="Söhne Mono"/>
+              </a:rPr>
+              <a:t>public</a:t>
+            </a:r>
+            <a:r>
+              <a:rPr lang="en-GB" b="0" i="0" dirty="0">
+                <a:solidFill>
+                  <a:srgbClr val="FFFFFF"/>
+                </a:solidFill>
+                <a:effectLst/>
+                <a:highlight>
+                  <a:srgbClr val="0D0D0D"/>
+                </a:highlight>
+                <a:latin typeface="Söhne Mono"/>
+              </a:rPr>
+              <a:t> </a:t>
+            </a:r>
+            <a:r>
+              <a:rPr lang="en-GB" b="0" i="0" dirty="0">
+                <a:solidFill>
+                  <a:srgbClr val="2E95D3"/>
+                </a:solidFill>
+                <a:effectLst/>
+                <a:highlight>
+                  <a:srgbClr val="0D0D0D"/>
+                </a:highlight>
+                <a:latin typeface="Söhne Mono"/>
+              </a:rPr>
+              <a:t>class</a:t>
+            </a:r>
+            <a:r>
+              <a:rPr lang="en-GB" b="0" i="0" dirty="0">
+                <a:solidFill>
+                  <a:srgbClr val="FFFFFF"/>
+                </a:solidFill>
+                <a:effectLst/>
+                <a:highlight>
+                  <a:srgbClr val="0D0D0D"/>
+                </a:highlight>
+                <a:latin typeface="Söhne Mono"/>
+              </a:rPr>
+              <a:t> </a:t>
+            </a:r>
+            <a:r>
+              <a:rPr lang="en-GB" b="0" i="0" dirty="0" err="1">
+                <a:solidFill>
+                  <a:srgbClr val="F22C3D"/>
+                </a:solidFill>
+                <a:effectLst/>
+                <a:highlight>
+                  <a:srgbClr val="0D0D0D"/>
+                </a:highlight>
+                <a:latin typeface="Söhne Mono"/>
+              </a:rPr>
+              <a:t>CopyValueOfExample</a:t>
+            </a:r>
+            <a:r>
+              <a:rPr lang="en-GB" b="0" i="0" dirty="0">
+                <a:solidFill>
+                  <a:srgbClr val="FFFFFF"/>
+                </a:solidFill>
+                <a:effectLst/>
+                <a:highlight>
+                  <a:srgbClr val="0D0D0D"/>
+                </a:highlight>
+                <a:latin typeface="Söhne Mono"/>
+              </a:rPr>
+              <a:t> { </a:t>
+            </a:r>
+          </a:p>
+          <a:p>
+            <a:r>
+              <a:rPr lang="en-GB" dirty="0">
+                <a:solidFill>
+                  <a:srgbClr val="FFFFFF"/>
+                </a:solidFill>
+                <a:highlight>
+                  <a:srgbClr val="0D0D0D"/>
+                </a:highlight>
+                <a:latin typeface="Söhne Mono"/>
+              </a:rPr>
+              <a:t>   </a:t>
+            </a:r>
+            <a:r>
+              <a:rPr lang="en-GB" b="0" i="0" dirty="0">
+                <a:solidFill>
+                  <a:srgbClr val="2E95D3"/>
+                </a:solidFill>
+                <a:effectLst/>
+                <a:highlight>
+                  <a:srgbClr val="0D0D0D"/>
+                </a:highlight>
+                <a:latin typeface="Söhne Mono"/>
+              </a:rPr>
+              <a:t>public</a:t>
+            </a:r>
+            <a:r>
+              <a:rPr lang="en-GB" b="0" i="0" dirty="0">
+                <a:solidFill>
+                  <a:srgbClr val="FFFFFF"/>
+                </a:solidFill>
+                <a:effectLst/>
+                <a:highlight>
+                  <a:srgbClr val="0D0D0D"/>
+                </a:highlight>
+                <a:latin typeface="Söhne Mono"/>
+              </a:rPr>
+              <a:t> </a:t>
+            </a:r>
+            <a:r>
+              <a:rPr lang="en-GB" b="0" i="0" dirty="0">
+                <a:solidFill>
+                  <a:srgbClr val="2E95D3"/>
+                </a:solidFill>
+                <a:effectLst/>
+                <a:highlight>
+                  <a:srgbClr val="0D0D0D"/>
+                </a:highlight>
+                <a:latin typeface="Söhne Mono"/>
+              </a:rPr>
+              <a:t>static</a:t>
+            </a:r>
+            <a:r>
+              <a:rPr lang="en-GB" b="0" i="0" dirty="0">
+                <a:solidFill>
+                  <a:srgbClr val="FFFFFF"/>
+                </a:solidFill>
+                <a:effectLst/>
+                <a:highlight>
+                  <a:srgbClr val="0D0D0D"/>
+                </a:highlight>
+                <a:latin typeface="Söhne Mono"/>
+              </a:rPr>
+              <a:t> </a:t>
+            </a:r>
+            <a:r>
+              <a:rPr lang="en-GB" b="0" i="0" dirty="0">
+                <a:solidFill>
+                  <a:srgbClr val="2E95D3"/>
+                </a:solidFill>
+                <a:effectLst/>
+                <a:highlight>
+                  <a:srgbClr val="0D0D0D"/>
+                </a:highlight>
+                <a:latin typeface="Söhne Mono"/>
+              </a:rPr>
+              <a:t>void</a:t>
+            </a:r>
+            <a:r>
+              <a:rPr lang="en-GB" b="0" i="0" dirty="0">
+                <a:solidFill>
+                  <a:srgbClr val="FFFFFF"/>
+                </a:solidFill>
+                <a:effectLst/>
+                <a:highlight>
+                  <a:srgbClr val="0D0D0D"/>
+                </a:highlight>
+                <a:latin typeface="Söhne Mono"/>
+              </a:rPr>
+              <a:t> </a:t>
+            </a:r>
+            <a:r>
+              <a:rPr lang="en-GB" b="0" i="0" dirty="0">
+                <a:solidFill>
+                  <a:srgbClr val="F22C3D"/>
+                </a:solidFill>
+                <a:effectLst/>
+                <a:highlight>
+                  <a:srgbClr val="0D0D0D"/>
+                </a:highlight>
+                <a:latin typeface="Söhne Mono"/>
+              </a:rPr>
+              <a:t>main</a:t>
+            </a:r>
+            <a:r>
+              <a:rPr lang="en-GB" b="0" i="0" dirty="0">
+                <a:solidFill>
+                  <a:srgbClr val="FFFFFF"/>
+                </a:solidFill>
+                <a:effectLst/>
+                <a:highlight>
+                  <a:srgbClr val="0D0D0D"/>
+                </a:highlight>
+                <a:latin typeface="Söhne Mono"/>
+              </a:rPr>
+              <a:t>(String[] </a:t>
+            </a:r>
+            <a:r>
+              <a:rPr lang="en-GB" b="0" i="0" dirty="0" err="1">
+                <a:solidFill>
+                  <a:srgbClr val="FFFFFF"/>
+                </a:solidFill>
+                <a:effectLst/>
+                <a:highlight>
+                  <a:srgbClr val="0D0D0D"/>
+                </a:highlight>
+                <a:latin typeface="Söhne Mono"/>
+              </a:rPr>
+              <a:t>args</a:t>
+            </a:r>
+            <a:r>
+              <a:rPr lang="en-GB" b="0" i="0" dirty="0">
+                <a:solidFill>
+                  <a:srgbClr val="FFFFFF"/>
+                </a:solidFill>
+                <a:effectLst/>
+                <a:highlight>
+                  <a:srgbClr val="0D0D0D"/>
+                </a:highlight>
+                <a:latin typeface="Söhne Mono"/>
+              </a:rPr>
+              <a:t>) {</a:t>
+            </a:r>
+          </a:p>
+          <a:p>
+            <a:r>
+              <a:rPr lang="en-GB" b="0" i="0" dirty="0">
+                <a:solidFill>
+                  <a:schemeClr val="bg1"/>
+                </a:solidFill>
+                <a:effectLst/>
+                <a:highlight>
+                  <a:srgbClr val="0D0D0D"/>
+                </a:highlight>
+                <a:latin typeface="Söhne Mono"/>
+              </a:rPr>
+              <a:t>    // Original character array </a:t>
+            </a:r>
+          </a:p>
+          <a:p>
+            <a:r>
+              <a:rPr lang="en-GB" b="0" i="0" dirty="0">
+                <a:solidFill>
+                  <a:srgbClr val="DF3079"/>
+                </a:solidFill>
+                <a:effectLst/>
+                <a:highlight>
+                  <a:srgbClr val="0D0D0D"/>
+                </a:highlight>
+                <a:latin typeface="Söhne Mono"/>
+              </a:rPr>
+              <a:t>    char</a:t>
+            </a:r>
+            <a:r>
+              <a:rPr lang="en-GB" b="0" i="0" dirty="0">
+                <a:solidFill>
+                  <a:srgbClr val="FFFFFF"/>
+                </a:solidFill>
+                <a:effectLst/>
+                <a:highlight>
+                  <a:srgbClr val="0D0D0D"/>
+                </a:highlight>
+                <a:latin typeface="Söhne Mono"/>
+              </a:rPr>
+              <a:t>[] data = {</a:t>
+            </a:r>
+            <a:r>
+              <a:rPr lang="en-GB" b="0" i="0" dirty="0">
+                <a:solidFill>
+                  <a:srgbClr val="00A67D"/>
+                </a:solidFill>
+                <a:effectLst/>
+                <a:highlight>
+                  <a:srgbClr val="0D0D0D"/>
+                </a:highlight>
+                <a:latin typeface="Söhne Mono"/>
+              </a:rPr>
+              <a:t>'H'</a:t>
+            </a:r>
+            <a:r>
+              <a:rPr lang="en-GB" b="0" i="0" dirty="0">
+                <a:solidFill>
+                  <a:srgbClr val="FFFFFF"/>
+                </a:solidFill>
+                <a:effectLst/>
+                <a:highlight>
+                  <a:srgbClr val="0D0D0D"/>
+                </a:highlight>
+                <a:latin typeface="Söhne Mono"/>
+              </a:rPr>
+              <a:t>, </a:t>
+            </a:r>
+            <a:r>
+              <a:rPr lang="en-GB" b="0" i="0" dirty="0">
+                <a:solidFill>
+                  <a:srgbClr val="00A67D"/>
+                </a:solidFill>
+                <a:effectLst/>
+                <a:highlight>
+                  <a:srgbClr val="0D0D0D"/>
+                </a:highlight>
+                <a:latin typeface="Söhne Mono"/>
+              </a:rPr>
+              <a:t>'e'</a:t>
+            </a:r>
+            <a:r>
+              <a:rPr lang="en-GB" b="0" i="0" dirty="0">
+                <a:solidFill>
+                  <a:srgbClr val="FFFFFF"/>
+                </a:solidFill>
+                <a:effectLst/>
+                <a:highlight>
+                  <a:srgbClr val="0D0D0D"/>
+                </a:highlight>
+                <a:latin typeface="Söhne Mono"/>
+              </a:rPr>
+              <a:t>, </a:t>
+            </a:r>
+            <a:r>
+              <a:rPr lang="en-GB" b="0" i="0" dirty="0">
+                <a:solidFill>
+                  <a:srgbClr val="00A67D"/>
+                </a:solidFill>
+                <a:effectLst/>
+                <a:highlight>
+                  <a:srgbClr val="0D0D0D"/>
+                </a:highlight>
+                <a:latin typeface="Söhne Mono"/>
+              </a:rPr>
+              <a:t>'l'</a:t>
+            </a:r>
+            <a:r>
+              <a:rPr lang="en-GB" b="0" i="0" dirty="0">
+                <a:solidFill>
+                  <a:srgbClr val="FFFFFF"/>
+                </a:solidFill>
+                <a:effectLst/>
+                <a:highlight>
+                  <a:srgbClr val="0D0D0D"/>
+                </a:highlight>
+                <a:latin typeface="Söhne Mono"/>
+              </a:rPr>
+              <a:t>, </a:t>
+            </a:r>
+            <a:r>
+              <a:rPr lang="en-GB" b="0" i="0" dirty="0">
+                <a:solidFill>
+                  <a:srgbClr val="00A67D"/>
+                </a:solidFill>
+                <a:effectLst/>
+                <a:highlight>
+                  <a:srgbClr val="0D0D0D"/>
+                </a:highlight>
+                <a:latin typeface="Söhne Mono"/>
+              </a:rPr>
+              <a:t>'l'</a:t>
+            </a:r>
+            <a:r>
+              <a:rPr lang="en-GB" b="0" i="0" dirty="0">
+                <a:solidFill>
+                  <a:srgbClr val="FFFFFF"/>
+                </a:solidFill>
+                <a:effectLst/>
+                <a:highlight>
+                  <a:srgbClr val="0D0D0D"/>
+                </a:highlight>
+                <a:latin typeface="Söhne Mono"/>
+              </a:rPr>
+              <a:t>, </a:t>
+            </a:r>
+            <a:r>
+              <a:rPr lang="en-GB" b="0" i="0" dirty="0">
+                <a:solidFill>
+                  <a:srgbClr val="00A67D"/>
+                </a:solidFill>
+                <a:effectLst/>
+                <a:highlight>
+                  <a:srgbClr val="0D0D0D"/>
+                </a:highlight>
+                <a:latin typeface="Söhne Mono"/>
+              </a:rPr>
+              <a:t>'o'</a:t>
+            </a:r>
+            <a:r>
+              <a:rPr lang="en-GB" b="0" i="0" dirty="0">
+                <a:solidFill>
+                  <a:srgbClr val="FFFFFF"/>
+                </a:solidFill>
+                <a:effectLst/>
+                <a:highlight>
+                  <a:srgbClr val="0D0D0D"/>
+                </a:highlight>
+                <a:latin typeface="Söhne Mono"/>
+              </a:rPr>
+              <a:t>, </a:t>
+            </a:r>
+            <a:r>
+              <a:rPr lang="en-GB" b="0" i="0" dirty="0">
+                <a:solidFill>
+                  <a:srgbClr val="00A67D"/>
+                </a:solidFill>
+                <a:effectLst/>
+                <a:highlight>
+                  <a:srgbClr val="0D0D0D"/>
+                </a:highlight>
+                <a:latin typeface="Söhne Mono"/>
+              </a:rPr>
+              <a:t>' '</a:t>
+            </a:r>
+            <a:r>
+              <a:rPr lang="en-GB" b="0" i="0" dirty="0">
+                <a:solidFill>
+                  <a:srgbClr val="FFFFFF"/>
+                </a:solidFill>
+                <a:effectLst/>
+                <a:highlight>
+                  <a:srgbClr val="0D0D0D"/>
+                </a:highlight>
+                <a:latin typeface="Söhne Mono"/>
+              </a:rPr>
+              <a:t>, </a:t>
+            </a:r>
+            <a:r>
+              <a:rPr lang="en-GB" b="0" i="0" dirty="0">
+                <a:solidFill>
+                  <a:srgbClr val="00A67D"/>
+                </a:solidFill>
+                <a:effectLst/>
+                <a:highlight>
+                  <a:srgbClr val="0D0D0D"/>
+                </a:highlight>
+                <a:latin typeface="Söhne Mono"/>
+              </a:rPr>
+              <a:t>'W'</a:t>
+            </a:r>
+            <a:r>
+              <a:rPr lang="en-GB" b="0" i="0" dirty="0">
+                <a:solidFill>
+                  <a:srgbClr val="FFFFFF"/>
+                </a:solidFill>
+                <a:effectLst/>
+                <a:highlight>
+                  <a:srgbClr val="0D0D0D"/>
+                </a:highlight>
+                <a:latin typeface="Söhne Mono"/>
+              </a:rPr>
+              <a:t>, </a:t>
+            </a:r>
+            <a:r>
+              <a:rPr lang="en-GB" b="0" i="0" dirty="0">
+                <a:solidFill>
+                  <a:srgbClr val="00A67D"/>
+                </a:solidFill>
+                <a:effectLst/>
+                <a:highlight>
+                  <a:srgbClr val="0D0D0D"/>
+                </a:highlight>
+                <a:latin typeface="Söhne Mono"/>
+              </a:rPr>
+              <a:t>'o'</a:t>
+            </a:r>
+            <a:r>
+              <a:rPr lang="en-GB" b="0" i="0" dirty="0">
+                <a:solidFill>
+                  <a:srgbClr val="FFFFFF"/>
+                </a:solidFill>
+                <a:effectLst/>
+                <a:highlight>
+                  <a:srgbClr val="0D0D0D"/>
+                </a:highlight>
+                <a:latin typeface="Söhne Mono"/>
+              </a:rPr>
+              <a:t>, </a:t>
+            </a:r>
+            <a:r>
+              <a:rPr lang="en-GB" b="0" i="0" dirty="0">
+                <a:solidFill>
+                  <a:srgbClr val="00A67D"/>
+                </a:solidFill>
+                <a:effectLst/>
+                <a:highlight>
+                  <a:srgbClr val="0D0D0D"/>
+                </a:highlight>
+                <a:latin typeface="Söhne Mono"/>
+              </a:rPr>
+              <a:t>'r'</a:t>
+            </a:r>
+            <a:r>
+              <a:rPr lang="en-GB" b="0" i="0" dirty="0">
+                <a:solidFill>
+                  <a:srgbClr val="FFFFFF"/>
+                </a:solidFill>
+                <a:effectLst/>
+                <a:highlight>
+                  <a:srgbClr val="0D0D0D"/>
+                </a:highlight>
+                <a:latin typeface="Söhne Mono"/>
+              </a:rPr>
+              <a:t>, </a:t>
+            </a:r>
+            <a:r>
+              <a:rPr lang="en-GB" b="0" i="0" dirty="0">
+                <a:solidFill>
+                  <a:srgbClr val="00A67D"/>
+                </a:solidFill>
+                <a:effectLst/>
+                <a:highlight>
+                  <a:srgbClr val="0D0D0D"/>
+                </a:highlight>
+                <a:latin typeface="Söhne Mono"/>
+              </a:rPr>
+              <a:t>'l'</a:t>
+            </a:r>
+            <a:r>
+              <a:rPr lang="en-GB" b="0" i="0" dirty="0">
+                <a:solidFill>
+                  <a:srgbClr val="FFFFFF"/>
+                </a:solidFill>
+                <a:effectLst/>
+                <a:highlight>
+                  <a:srgbClr val="0D0D0D"/>
+                </a:highlight>
+                <a:latin typeface="Söhne Mono"/>
+              </a:rPr>
+              <a:t>, </a:t>
+            </a:r>
+            <a:r>
+              <a:rPr lang="en-GB" b="0" i="0" dirty="0">
+                <a:solidFill>
+                  <a:srgbClr val="00A67D"/>
+                </a:solidFill>
+                <a:effectLst/>
+                <a:highlight>
+                  <a:srgbClr val="0D0D0D"/>
+                </a:highlight>
+                <a:latin typeface="Söhne Mono"/>
+              </a:rPr>
+              <a:t>'d'</a:t>
+            </a:r>
+            <a:r>
+              <a:rPr lang="en-GB" b="0" i="0" dirty="0">
+                <a:solidFill>
+                  <a:srgbClr val="FFFFFF"/>
+                </a:solidFill>
+                <a:effectLst/>
+                <a:highlight>
+                  <a:srgbClr val="0D0D0D"/>
+                </a:highlight>
+                <a:latin typeface="Söhne Mono"/>
+              </a:rPr>
+              <a:t>, </a:t>
+            </a:r>
+            <a:r>
+              <a:rPr lang="en-GB" b="0" i="0" dirty="0">
+                <a:solidFill>
+                  <a:srgbClr val="00A67D"/>
+                </a:solidFill>
+                <a:effectLst/>
+                <a:highlight>
+                  <a:srgbClr val="0D0D0D"/>
+                </a:highlight>
+                <a:latin typeface="Söhne Mono"/>
+              </a:rPr>
+              <a:t>'!’</a:t>
+            </a:r>
+            <a:r>
+              <a:rPr lang="en-GB" b="0" i="0" dirty="0">
+                <a:solidFill>
+                  <a:srgbClr val="FFFFFF"/>
+                </a:solidFill>
+                <a:effectLst/>
+                <a:highlight>
+                  <a:srgbClr val="0D0D0D"/>
+                </a:highlight>
+                <a:latin typeface="Söhne Mono"/>
+              </a:rPr>
+              <a:t>};</a:t>
+            </a:r>
+          </a:p>
+          <a:p>
+            <a:r>
+              <a:rPr lang="en-GB" b="0" i="0" dirty="0">
+                <a:solidFill>
+                  <a:schemeClr val="bg1"/>
+                </a:solidFill>
+                <a:effectLst/>
+                <a:highlight>
+                  <a:srgbClr val="0D0D0D"/>
+                </a:highlight>
+                <a:latin typeface="Söhne Mono"/>
+              </a:rPr>
+              <a:t>    // Using </a:t>
+            </a:r>
+            <a:r>
+              <a:rPr lang="en-GB" b="0" i="0" dirty="0" err="1">
+                <a:solidFill>
+                  <a:schemeClr val="bg1"/>
+                </a:solidFill>
+                <a:effectLst/>
+                <a:highlight>
+                  <a:srgbClr val="0D0D0D"/>
+                </a:highlight>
+                <a:latin typeface="Söhne Mono"/>
+              </a:rPr>
+              <a:t>copyValueOf</a:t>
+            </a:r>
+            <a:r>
+              <a:rPr lang="en-GB" b="0" i="0" dirty="0">
+                <a:solidFill>
+                  <a:schemeClr val="bg1"/>
+                </a:solidFill>
+                <a:effectLst/>
+                <a:highlight>
+                  <a:srgbClr val="0D0D0D"/>
+                </a:highlight>
+                <a:latin typeface="Söhne Mono"/>
+              </a:rPr>
+              <a:t>(char[] data)</a:t>
+            </a:r>
+            <a:r>
+              <a:rPr lang="en-GB" b="0" i="0" dirty="0">
+                <a:solidFill>
+                  <a:srgbClr val="FFFFFF"/>
+                </a:solidFill>
+                <a:effectLst/>
+                <a:highlight>
+                  <a:srgbClr val="0D0D0D"/>
+                </a:highlight>
+                <a:latin typeface="Söhne Mono"/>
+              </a:rPr>
+              <a:t> </a:t>
+            </a:r>
+          </a:p>
+          <a:p>
+            <a:r>
+              <a:rPr lang="en-GB" b="0" i="0" dirty="0">
+                <a:solidFill>
+                  <a:srgbClr val="DF3079"/>
+                </a:solidFill>
+                <a:effectLst/>
+                <a:highlight>
+                  <a:srgbClr val="0D0D0D"/>
+                </a:highlight>
+                <a:latin typeface="Söhne Mono"/>
+              </a:rPr>
+              <a:t>    String</a:t>
+            </a:r>
+            <a:r>
+              <a:rPr lang="en-GB" b="0" i="0" dirty="0">
+                <a:solidFill>
+                  <a:srgbClr val="FFFFFF"/>
+                </a:solidFill>
+                <a:effectLst/>
+                <a:highlight>
+                  <a:srgbClr val="0D0D0D"/>
+                </a:highlight>
+                <a:latin typeface="Söhne Mono"/>
+              </a:rPr>
+              <a:t> </a:t>
+            </a:r>
+            <a:r>
+              <a:rPr lang="en-GB" b="0" i="0" dirty="0">
+                <a:solidFill>
+                  <a:srgbClr val="DF3079"/>
+                </a:solidFill>
+                <a:effectLst/>
+                <a:highlight>
+                  <a:srgbClr val="0D0D0D"/>
+                </a:highlight>
+                <a:latin typeface="Söhne Mono"/>
+              </a:rPr>
+              <a:t>str1</a:t>
+            </a:r>
+            <a:r>
+              <a:rPr lang="en-GB" b="0" i="0" dirty="0">
+                <a:solidFill>
+                  <a:srgbClr val="FFFFFF"/>
+                </a:solidFill>
+                <a:effectLst/>
+                <a:highlight>
+                  <a:srgbClr val="0D0D0D"/>
+                </a:highlight>
+                <a:latin typeface="Söhne Mono"/>
+              </a:rPr>
+              <a:t> = </a:t>
+            </a:r>
+            <a:r>
+              <a:rPr lang="en-GB" b="0" i="0" dirty="0" err="1">
+                <a:solidFill>
+                  <a:srgbClr val="FFFFFF"/>
+                </a:solidFill>
+                <a:effectLst/>
+                <a:highlight>
+                  <a:srgbClr val="0D0D0D"/>
+                </a:highlight>
+                <a:latin typeface="Söhne Mono"/>
+              </a:rPr>
+              <a:t>String.copyValueOf</a:t>
+            </a:r>
+            <a:r>
+              <a:rPr lang="en-GB" b="0" i="0" dirty="0">
+                <a:solidFill>
+                  <a:srgbClr val="FFFFFF"/>
+                </a:solidFill>
+                <a:effectLst/>
+                <a:highlight>
+                  <a:srgbClr val="0D0D0D"/>
+                </a:highlight>
+                <a:latin typeface="Söhne Mono"/>
+              </a:rPr>
+              <a:t>(data); </a:t>
+            </a:r>
+            <a:r>
+              <a:rPr lang="en-GB" b="0" i="0" dirty="0" err="1">
+                <a:solidFill>
+                  <a:srgbClr val="FFFFFF"/>
+                </a:solidFill>
+                <a:effectLst/>
+                <a:highlight>
+                  <a:srgbClr val="0D0D0D"/>
+                </a:highlight>
+                <a:latin typeface="Söhne Mono"/>
+              </a:rPr>
+              <a:t>System.out.println</a:t>
+            </a:r>
+            <a:r>
+              <a:rPr lang="en-GB" b="0" i="0" dirty="0">
+                <a:solidFill>
+                  <a:srgbClr val="FFFFFF"/>
+                </a:solidFill>
+                <a:effectLst/>
+                <a:highlight>
+                  <a:srgbClr val="0D0D0D"/>
+                </a:highlight>
+                <a:latin typeface="Söhne Mono"/>
+              </a:rPr>
+              <a:t>(</a:t>
+            </a:r>
+            <a:r>
+              <a:rPr lang="en-GB" b="0" i="0" dirty="0">
+                <a:solidFill>
+                  <a:srgbClr val="00A67D"/>
+                </a:solidFill>
+                <a:effectLst/>
+                <a:highlight>
+                  <a:srgbClr val="0D0D0D"/>
+                </a:highlight>
+                <a:latin typeface="Söhne Mono"/>
+              </a:rPr>
+              <a:t>"str1: "</a:t>
+            </a:r>
+            <a:r>
+              <a:rPr lang="en-GB" b="0" i="0" dirty="0">
+                <a:solidFill>
+                  <a:srgbClr val="FFFFFF"/>
+                </a:solidFill>
+                <a:effectLst/>
+                <a:highlight>
+                  <a:srgbClr val="0D0D0D"/>
+                </a:highlight>
+                <a:latin typeface="Söhne Mono"/>
+              </a:rPr>
+              <a:t> + str1);</a:t>
+            </a:r>
+          </a:p>
+          <a:p>
+            <a:r>
+              <a:rPr lang="en-GB" b="0" i="0" dirty="0">
+                <a:solidFill>
+                  <a:schemeClr val="bg1"/>
+                </a:solidFill>
+                <a:effectLst/>
+                <a:highlight>
+                  <a:srgbClr val="0D0D0D"/>
+                </a:highlight>
+                <a:latin typeface="Söhne Mono"/>
+              </a:rPr>
+              <a:t>    // Using </a:t>
+            </a:r>
+            <a:r>
+              <a:rPr lang="en-GB" b="0" i="0" dirty="0" err="1">
+                <a:solidFill>
+                  <a:schemeClr val="bg1"/>
+                </a:solidFill>
+                <a:effectLst/>
+                <a:highlight>
+                  <a:srgbClr val="0D0D0D"/>
+                </a:highlight>
+                <a:latin typeface="Söhne Mono"/>
+              </a:rPr>
+              <a:t>copyValueOf</a:t>
+            </a:r>
+            <a:r>
+              <a:rPr lang="en-GB" b="0" i="0" dirty="0">
+                <a:solidFill>
+                  <a:schemeClr val="bg1"/>
+                </a:solidFill>
+                <a:effectLst/>
+                <a:highlight>
+                  <a:srgbClr val="0D0D0D"/>
+                </a:highlight>
+                <a:latin typeface="Söhne Mono"/>
+              </a:rPr>
+              <a:t>(char[] data, int offset, int count)</a:t>
+            </a:r>
+            <a:r>
+              <a:rPr lang="en-GB" b="0" i="0" dirty="0">
+                <a:solidFill>
+                  <a:srgbClr val="FFFFFF"/>
+                </a:solidFill>
+                <a:effectLst/>
+                <a:highlight>
+                  <a:srgbClr val="0D0D0D"/>
+                </a:highlight>
+                <a:latin typeface="Söhne Mono"/>
+              </a:rPr>
+              <a:t> </a:t>
+            </a:r>
+          </a:p>
+          <a:p>
+            <a:r>
+              <a:rPr lang="en-GB" b="0" i="0" dirty="0">
+                <a:solidFill>
+                  <a:srgbClr val="DF3079"/>
+                </a:solidFill>
+                <a:effectLst/>
+                <a:highlight>
+                  <a:srgbClr val="0D0D0D"/>
+                </a:highlight>
+                <a:latin typeface="Söhne Mono"/>
+              </a:rPr>
+              <a:t>    String</a:t>
+            </a:r>
+            <a:r>
+              <a:rPr lang="en-GB" b="0" i="0" dirty="0">
+                <a:solidFill>
+                  <a:srgbClr val="FFFFFF"/>
+                </a:solidFill>
+                <a:effectLst/>
+                <a:highlight>
+                  <a:srgbClr val="0D0D0D"/>
+                </a:highlight>
+                <a:latin typeface="Söhne Mono"/>
+              </a:rPr>
+              <a:t> </a:t>
+            </a:r>
+            <a:r>
+              <a:rPr lang="en-GB" b="0" i="0" dirty="0">
+                <a:solidFill>
+                  <a:srgbClr val="DF3079"/>
+                </a:solidFill>
+                <a:effectLst/>
+                <a:highlight>
+                  <a:srgbClr val="0D0D0D"/>
+                </a:highlight>
+                <a:latin typeface="Söhne Mono"/>
+              </a:rPr>
+              <a:t>str2</a:t>
+            </a:r>
+            <a:r>
+              <a:rPr lang="en-GB" b="0" i="0" dirty="0">
+                <a:solidFill>
+                  <a:srgbClr val="FFFFFF"/>
+                </a:solidFill>
+                <a:effectLst/>
+                <a:highlight>
+                  <a:srgbClr val="0D0D0D"/>
+                </a:highlight>
+                <a:latin typeface="Söhne Mono"/>
+              </a:rPr>
+              <a:t> = </a:t>
+            </a:r>
+            <a:r>
+              <a:rPr lang="en-GB" b="0" i="0" dirty="0" err="1">
+                <a:solidFill>
+                  <a:srgbClr val="FFFFFF"/>
+                </a:solidFill>
+                <a:effectLst/>
+                <a:highlight>
+                  <a:srgbClr val="0D0D0D"/>
+                </a:highlight>
+                <a:latin typeface="Söhne Mono"/>
+              </a:rPr>
+              <a:t>String.copyValueOf</a:t>
+            </a:r>
+            <a:r>
+              <a:rPr lang="en-GB" b="0" i="0" dirty="0">
+                <a:solidFill>
+                  <a:srgbClr val="FFFFFF"/>
+                </a:solidFill>
+                <a:effectLst/>
+                <a:highlight>
+                  <a:srgbClr val="0D0D0D"/>
+                </a:highlight>
+                <a:latin typeface="Söhne Mono"/>
+              </a:rPr>
+              <a:t>(data, </a:t>
+            </a:r>
+            <a:r>
+              <a:rPr lang="en-GB" b="0" i="0" dirty="0">
+                <a:solidFill>
+                  <a:srgbClr val="DF3079"/>
+                </a:solidFill>
+                <a:effectLst/>
+                <a:highlight>
+                  <a:srgbClr val="0D0D0D"/>
+                </a:highlight>
+                <a:latin typeface="Söhne Mono"/>
+              </a:rPr>
+              <a:t>6</a:t>
+            </a:r>
+            <a:r>
+              <a:rPr lang="en-GB" b="0" i="0" dirty="0">
+                <a:solidFill>
+                  <a:srgbClr val="FFFFFF"/>
+                </a:solidFill>
+                <a:effectLst/>
+                <a:highlight>
+                  <a:srgbClr val="0D0D0D"/>
+                </a:highlight>
+                <a:latin typeface="Söhne Mono"/>
+              </a:rPr>
+              <a:t>, </a:t>
+            </a:r>
+            <a:r>
+              <a:rPr lang="en-GB" b="0" i="0" dirty="0">
+                <a:solidFill>
+                  <a:srgbClr val="DF3079"/>
+                </a:solidFill>
+                <a:effectLst/>
+                <a:highlight>
+                  <a:srgbClr val="0D0D0D"/>
+                </a:highlight>
+                <a:latin typeface="Söhne Mono"/>
+              </a:rPr>
+              <a:t>5</a:t>
+            </a:r>
+            <a:r>
+              <a:rPr lang="en-GB" b="0" i="0" dirty="0">
+                <a:solidFill>
+                  <a:schemeClr val="bg1"/>
+                </a:solidFill>
+                <a:effectLst/>
+                <a:highlight>
+                  <a:srgbClr val="0D0D0D"/>
+                </a:highlight>
+                <a:latin typeface="Söhne Mono"/>
+              </a:rPr>
+              <a:t>); </a:t>
+            </a:r>
+          </a:p>
+          <a:p>
+            <a:r>
+              <a:rPr lang="en-GB" dirty="0">
+                <a:solidFill>
+                  <a:schemeClr val="bg1"/>
+                </a:solidFill>
+                <a:highlight>
+                  <a:srgbClr val="0D0D0D"/>
+                </a:highlight>
+                <a:latin typeface="Söhne Mono"/>
+              </a:rPr>
+              <a:t>    </a:t>
+            </a:r>
+            <a:r>
+              <a:rPr lang="en-GB" b="0" i="0" dirty="0">
+                <a:solidFill>
+                  <a:schemeClr val="bg1"/>
+                </a:solidFill>
+                <a:effectLst/>
+                <a:highlight>
+                  <a:srgbClr val="0D0D0D"/>
+                </a:highlight>
+                <a:latin typeface="Söhne Mono"/>
+              </a:rPr>
+              <a:t>// Starting from index 6, take 5 characters </a:t>
+            </a:r>
+          </a:p>
+          <a:p>
+            <a:r>
+              <a:rPr lang="en-GB" dirty="0">
+                <a:solidFill>
+                  <a:schemeClr val="bg1"/>
+                </a:solidFill>
+                <a:highlight>
+                  <a:srgbClr val="0D0D0D"/>
+                </a:highlight>
+                <a:latin typeface="Söhne Mono"/>
+              </a:rPr>
+              <a:t>    </a:t>
+            </a:r>
+            <a:r>
+              <a:rPr lang="en-GB" b="0" i="0" dirty="0" err="1">
+                <a:solidFill>
+                  <a:srgbClr val="FFFFFF"/>
+                </a:solidFill>
+                <a:effectLst/>
+                <a:highlight>
+                  <a:srgbClr val="0D0D0D"/>
+                </a:highlight>
+                <a:latin typeface="Söhne Mono"/>
+              </a:rPr>
+              <a:t>System.out.println</a:t>
+            </a:r>
+            <a:r>
+              <a:rPr lang="en-GB" b="0" i="0" dirty="0">
+                <a:solidFill>
+                  <a:srgbClr val="FFFFFF"/>
+                </a:solidFill>
+                <a:effectLst/>
+                <a:highlight>
+                  <a:srgbClr val="0D0D0D"/>
+                </a:highlight>
+                <a:latin typeface="Söhne Mono"/>
+              </a:rPr>
+              <a:t>(</a:t>
+            </a:r>
+            <a:r>
+              <a:rPr lang="en-GB" b="0" i="0" dirty="0">
+                <a:solidFill>
+                  <a:srgbClr val="00A67D"/>
+                </a:solidFill>
+                <a:effectLst/>
+                <a:highlight>
+                  <a:srgbClr val="0D0D0D"/>
+                </a:highlight>
+                <a:latin typeface="Söhne Mono"/>
+              </a:rPr>
+              <a:t>"str2: "</a:t>
+            </a:r>
+            <a:r>
+              <a:rPr lang="en-GB" b="0" i="0" dirty="0">
+                <a:solidFill>
+                  <a:srgbClr val="FFFFFF"/>
+                </a:solidFill>
+                <a:effectLst/>
+                <a:highlight>
+                  <a:srgbClr val="0D0D0D"/>
+                </a:highlight>
+                <a:latin typeface="Söhne Mono"/>
+              </a:rPr>
+              <a:t> + str2); </a:t>
+            </a:r>
+          </a:p>
+          <a:p>
+            <a:r>
+              <a:rPr lang="en-GB" dirty="0">
+                <a:solidFill>
+                  <a:srgbClr val="FFFFFF"/>
+                </a:solidFill>
+                <a:highlight>
+                  <a:srgbClr val="0D0D0D"/>
+                </a:highlight>
+                <a:latin typeface="Söhne Mono"/>
+              </a:rPr>
+              <a:t>   </a:t>
+            </a:r>
+            <a:r>
+              <a:rPr lang="en-GB" b="0" i="0" dirty="0">
+                <a:solidFill>
+                  <a:srgbClr val="FFFFFF"/>
+                </a:solidFill>
+                <a:effectLst/>
+                <a:highlight>
+                  <a:srgbClr val="0D0D0D"/>
+                </a:highlight>
+                <a:latin typeface="Söhne Mono"/>
+              </a:rPr>
+              <a:t>} </a:t>
+            </a:r>
+          </a:p>
+          <a:p>
+            <a:r>
+              <a:rPr lang="en-GB" b="0" i="0" dirty="0">
+                <a:solidFill>
+                  <a:srgbClr val="FFFFFF"/>
+                </a:solidFill>
+                <a:effectLst/>
+                <a:highlight>
+                  <a:srgbClr val="0D0D0D"/>
+                </a:highlight>
+                <a:latin typeface="Söhne Mono"/>
+              </a:rPr>
+              <a:t>}</a:t>
+            </a:r>
+            <a:endParaRPr lang="en-RO" dirty="0"/>
+          </a:p>
+        </p:txBody>
+      </p:sp>
+      <p:pic>
+        <p:nvPicPr>
+          <p:cNvPr id="3" name="Picture 2">
+            <a:extLst>
+              <a:ext uri="{FF2B5EF4-FFF2-40B4-BE49-F238E27FC236}">
+                <a16:creationId xmlns:a16="http://schemas.microsoft.com/office/drawing/2014/main" id="{9811A92F-135C-6A4F-61CE-9435F1878F86}"/>
+              </a:ext>
+            </a:extLst>
+          </p:cNvPr>
+          <p:cNvPicPr>
+            <a:picLocks noChangeAspect="1"/>
+          </p:cNvPicPr>
+          <p:nvPr/>
+        </p:nvPicPr>
+        <p:blipFill>
+          <a:blip r:embed="rId3"/>
+          <a:stretch>
+            <a:fillRect/>
+          </a:stretch>
+        </p:blipFill>
+        <p:spPr>
+          <a:xfrm>
+            <a:off x="890851" y="4293140"/>
+            <a:ext cx="8634883" cy="964660"/>
+          </a:xfrm>
+          <a:prstGeom prst="rect">
+            <a:avLst/>
+          </a:prstGeom>
+        </p:spPr>
+      </p:pic>
+    </p:spTree>
+    <p:extLst>
+      <p:ext uri="{BB962C8B-B14F-4D97-AF65-F5344CB8AC3E}">
+        <p14:creationId xmlns:p14="http://schemas.microsoft.com/office/powerpoint/2010/main" val="3282949166"/>
+      </p:ext>
+    </p:extLst>
+  </p:cSld>
+  <p:clrMapOvr>
+    <a:masterClrMapping/>
+  </p:clrMapOvr>
+</p:sld>
+</file>
+
+<file path=ppt/slides/slide19.xml><?xml version="1.0" encoding="utf-8"?>
+<p:sld xmlns:a="http://schemas.openxmlformats.org/drawingml/2006/main" xmlns:r="http://schemas.openxmlformats.org/officeDocument/2006/relationships" xmlns:p="http://schemas.openxmlformats.org/presentationml/2006/main">
+  <p:cSld>
+    <p:bg>
+      <p:bgPr>
+        <a:solidFill>
+          <a:schemeClr val="bg1"/>
+        </a:solidFill>
+        <a:effectLst/>
+      </p:bgPr>
+    </p:bg>
+    <p:spTree>
+      <p:nvGrpSpPr>
+        <p:cNvPr id="1" name=""/>
+        <p:cNvGrpSpPr/>
+        <p:nvPr/>
+      </p:nvGrpSpPr>
+      <p:grpSpPr>
+        <a:xfrm>
+          <a:off x="0" y="0"/>
+          <a:ext cx="0" cy="0"/>
+          <a:chOff x="0" y="0"/>
+          <a:chExt cx="0" cy="0"/>
+        </a:xfrm>
+      </p:grpSpPr>
+      <p:sp useBgFill="1">
+        <p:nvSpPr>
+          <p:cNvPr id="9" name="Rectangle 8">
+            <a:extLst>
+              <a:ext uri="{FF2B5EF4-FFF2-40B4-BE49-F238E27FC236}">
+                <a16:creationId xmlns:a16="http://schemas.microsoft.com/office/drawing/2014/main" id="{AB8C311F-7253-4AED-9701-7FC0708C41C7}"/>
+              </a:ext>
+              <a:ext uri="{C183D7F6-B498-43B3-948B-1728B52AA6E4}">
+                <adec:decorative xmlns:adec="http://schemas.microsoft.com/office/drawing/2017/decorative" val="1"/>
+              </a:ext>
+            </a:extLst>
+          </p:cNvPr>
+          <p:cNvSpPr>
+            <a:spLocks noGrp="1" noRot="1" noChangeAspect="1" noMove="1" noResize="1" noEditPoints="1" noAdjustHandles="1" noChangeArrowheads="1" noChangeShapeType="1" noTextEdit="1"/>
+          </p:cNvSpPr>
+          <p:nvPr>
+            <p:extLst>
+              <p:ext uri="{386F3935-93C4-4BCD-93E2-E3B085C9AB24}">
+                <p16:designElem xmlns:p16="http://schemas.microsoft.com/office/powerpoint/2015/main" val="1"/>
+              </p:ext>
+            </p:extLst>
+          </p:nvPr>
+        </p:nvSpPr>
+        <p:spPr>
+          <a:xfrm>
+            <a:off x="0" y="0"/>
+            <a:ext cx="12192000" cy="6858000"/>
+          </a:xfrm>
+          <a:prstGeom prst="rect">
+            <a:avLst/>
+          </a:prstGeom>
+          <a:ln w="12700" cap="flat" cmpd="sng" algn="ctr">
+            <a:noFill/>
+            <a:prstDash val="solid"/>
+            <a:miter lim="800000"/>
+          </a:ln>
+          <a:effectLst/>
+          <a:extLst>
+            <a:ext uri="{91240B29-F687-4F45-9708-019B960494DF}">
+              <a14:hiddenLine xmlns:a14="http://schemas.microsoft.com/office/drawing/2010/main" w="12700" cap="flat" cmpd="sng" algn="ctr">
+                <a:solidFill>
+                  <a:schemeClr val="accent1">
+                    <a:shade val="50000"/>
+                  </a:schemeClr>
+                </a:solidFill>
+                <a:prstDash val="solid"/>
+                <a:miter lim="800000"/>
+              </a14:hiddenLine>
+            </a:ext>
+          </a:extLst>
+        </p:spPr>
+        <p:style>
+          <a:lnRef idx="2">
+            <a:schemeClr val="accent1">
+              <a:shade val="50000"/>
+            </a:schemeClr>
+          </a:lnRef>
+          <a:fillRef idx="1">
+            <a:schemeClr val="accent1"/>
+          </a:fillRef>
+          <a:effectRef idx="0">
+            <a:schemeClr val="accent1"/>
+          </a:effectRef>
+          <a:fontRef idx="minor">
+            <a:schemeClr val="lt1"/>
+          </a:fontRef>
+        </p:style>
+        <p:txBody>
+          <a:bodyPr rtlCol="0" anchor="ctr"/>
+          <a:lstStyle/>
+          <a:p>
+            <a:pPr algn="ctr"/>
+            <a:endParaRPr lang="en-US"/>
+          </a:p>
+        </p:txBody>
+      </p:sp>
+      <p:sp>
+        <p:nvSpPr>
+          <p:cNvPr id="11" name="Rectangle 10">
+            <a:extLst>
+              <a:ext uri="{FF2B5EF4-FFF2-40B4-BE49-F238E27FC236}">
+                <a16:creationId xmlns:a16="http://schemas.microsoft.com/office/drawing/2014/main" id="{E2384209-CB15-4CDF-9D31-C44FD9A3F20D}"/>
+              </a:ext>
+              <a:ext uri="{C183D7F6-B498-43B3-948B-1728B52AA6E4}">
+                <adec:decorative xmlns:adec="http://schemas.microsoft.com/office/drawing/2017/decorative" val="1"/>
+              </a:ext>
+            </a:extLst>
+          </p:cNvPr>
+          <p:cNvSpPr>
+            <a:spLocks noGrp="1" noRot="1" noChangeAspect="1" noMove="1" noResize="1" noEditPoints="1" noAdjustHandles="1" noChangeArrowheads="1" noChangeShapeType="1" noTextEdit="1"/>
+          </p:cNvSpPr>
+          <p:nvPr>
+            <p:extLst>
+              <p:ext uri="{386F3935-93C4-4BCD-93E2-E3B085C9AB24}">
+                <p16:designElem xmlns:p16="http://schemas.microsoft.com/office/powerpoint/2015/main" val="1"/>
+              </p:ext>
+            </p:extLst>
+          </p:nvPr>
+        </p:nvSpPr>
+        <p:spPr>
+          <a:xfrm rot="16200000" flipH="1">
+            <a:off x="2666617" y="-2666188"/>
+            <a:ext cx="6858000" cy="12191233"/>
+          </a:xfrm>
+          <a:prstGeom prst="rect">
+            <a:avLst/>
+          </a:prstGeom>
+          <a:gradFill>
+            <a:gsLst>
+              <a:gs pos="8000">
+                <a:schemeClr val="accent1"/>
+              </a:gs>
+              <a:gs pos="100000">
+                <a:schemeClr val="accent1">
+                  <a:lumMod val="50000"/>
+                </a:schemeClr>
+              </a:gs>
+            </a:gsLst>
+            <a:lin ang="12000000" scaled="0"/>
+          </a:gradFill>
+          <a:ln>
+            <a:noFill/>
+          </a:ln>
+        </p:spPr>
+        <p:style>
+          <a:lnRef idx="2">
+            <a:schemeClr val="accent1">
+              <a:shade val="50000"/>
+            </a:schemeClr>
+          </a:lnRef>
+          <a:fillRef idx="1">
+            <a:schemeClr val="accent1"/>
+          </a:fillRef>
+          <a:effectRef idx="0">
+            <a:schemeClr val="accent1"/>
+          </a:effectRef>
+          <a:fontRef idx="minor">
+            <a:schemeClr val="lt1"/>
+          </a:fontRef>
+        </p:style>
+        <p:txBody>
+          <a:bodyPr rtlCol="0" anchor="ctr"/>
+          <a:lstStyle/>
+          <a:p>
+            <a:pPr algn="ctr"/>
+            <a:endParaRPr lang="en-US"/>
+          </a:p>
+        </p:txBody>
+      </p:sp>
+      <p:sp>
+        <p:nvSpPr>
+          <p:cNvPr id="13" name="Rectangle 12">
+            <a:extLst>
+              <a:ext uri="{FF2B5EF4-FFF2-40B4-BE49-F238E27FC236}">
+                <a16:creationId xmlns:a16="http://schemas.microsoft.com/office/drawing/2014/main" id="{2633B3B5-CC90-43F0-8714-D31D1F3F0209}"/>
+              </a:ext>
+              <a:ext uri="{C183D7F6-B498-43B3-948B-1728B52AA6E4}">
+                <adec:decorative xmlns:adec="http://schemas.microsoft.com/office/drawing/2017/decorative" val="1"/>
+              </a:ext>
+            </a:extLst>
+          </p:cNvPr>
+          <p:cNvSpPr>
+            <a:spLocks noGrp="1" noRot="1" noChangeAspect="1" noMove="1" noResize="1" noEditPoints="1" noAdjustHandles="1" noChangeArrowheads="1" noChangeShapeType="1" noTextEdit="1"/>
+          </p:cNvSpPr>
+          <p:nvPr>
+            <p:extLst>
+              <p:ext uri="{386F3935-93C4-4BCD-93E2-E3B085C9AB24}">
+                <p16:designElem xmlns:p16="http://schemas.microsoft.com/office/powerpoint/2015/main" val="1"/>
+              </p:ext>
+            </p:extLst>
+          </p:nvPr>
+        </p:nvSpPr>
+        <p:spPr>
+          <a:xfrm rot="10800000" flipH="1">
+            <a:off x="-2311" y="0"/>
+            <a:ext cx="9070846" cy="6857572"/>
+          </a:xfrm>
+          <a:prstGeom prst="rect">
+            <a:avLst/>
+          </a:prstGeom>
+          <a:gradFill>
+            <a:gsLst>
+              <a:gs pos="8000">
+                <a:srgbClr val="000000">
+                  <a:alpha val="52000"/>
+                </a:srgbClr>
+              </a:gs>
+              <a:gs pos="100000">
+                <a:schemeClr val="accent1"/>
+              </a:gs>
+            </a:gsLst>
+            <a:lin ang="4800000" scaled="0"/>
+          </a:gradFill>
+          <a:ln>
+            <a:noFill/>
+          </a:ln>
+        </p:spPr>
+        <p:style>
+          <a:lnRef idx="2">
+            <a:schemeClr val="accent1">
+              <a:shade val="50000"/>
+            </a:schemeClr>
+          </a:lnRef>
+          <a:fillRef idx="1">
+            <a:schemeClr val="accent1"/>
+          </a:fillRef>
+          <a:effectRef idx="0">
+            <a:schemeClr val="accent1"/>
+          </a:effectRef>
+          <a:fontRef idx="minor">
+            <a:schemeClr val="lt1"/>
+          </a:fontRef>
+        </p:style>
+        <p:txBody>
+          <a:bodyPr rtlCol="0" anchor="ctr"/>
+          <a:lstStyle/>
+          <a:p>
+            <a:pPr algn="ctr"/>
+            <a:endParaRPr lang="en-US"/>
+          </a:p>
+        </p:txBody>
+      </p:sp>
+      <p:sp>
+        <p:nvSpPr>
+          <p:cNvPr id="15" name="Rectangle 14">
+            <a:extLst>
+              <a:ext uri="{FF2B5EF4-FFF2-40B4-BE49-F238E27FC236}">
+                <a16:creationId xmlns:a16="http://schemas.microsoft.com/office/drawing/2014/main" id="{A8D57A06-A426-446D-B02C-A2DC6B62E45E}"/>
+              </a:ext>
+              <a:ext uri="{C183D7F6-B498-43B3-948B-1728B52AA6E4}">
+                <adec:decorative xmlns:adec="http://schemas.microsoft.com/office/drawing/2017/decorative" val="1"/>
+              </a:ext>
+            </a:extLst>
+          </p:cNvPr>
+          <p:cNvSpPr>
+            <a:spLocks noGrp="1" noRot="1" noChangeAspect="1" noMove="1" noResize="1" noEditPoints="1" noAdjustHandles="1" noChangeArrowheads="1" noChangeShapeType="1" noTextEdit="1"/>
+          </p:cNvSpPr>
+          <p:nvPr>
+            <p:extLst>
+              <p:ext uri="{386F3935-93C4-4BCD-93E2-E3B085C9AB24}">
+                <p16:designElem xmlns:p16="http://schemas.microsoft.com/office/powerpoint/2015/main" val="1"/>
+              </p:ext>
+            </p:extLst>
+          </p:nvPr>
+        </p:nvSpPr>
+        <p:spPr>
+          <a:xfrm rot="16200000" flipH="1">
+            <a:off x="3649491" y="-1685840"/>
+            <a:ext cx="4894564" cy="12193546"/>
+          </a:xfrm>
+          <a:prstGeom prst="rect">
+            <a:avLst/>
+          </a:prstGeom>
+          <a:gradFill>
+            <a:gsLst>
+              <a:gs pos="0">
+                <a:schemeClr val="accent5">
+                  <a:lumMod val="60000"/>
+                  <a:lumOff val="40000"/>
+                  <a:alpha val="0"/>
+                </a:schemeClr>
+              </a:gs>
+              <a:gs pos="100000">
+                <a:srgbClr val="000000">
+                  <a:alpha val="46000"/>
+                </a:srgbClr>
+              </a:gs>
+            </a:gsLst>
+            <a:lin ang="1200000" scaled="0"/>
+          </a:gradFill>
+          <a:ln>
+            <a:noFill/>
+          </a:ln>
+        </p:spPr>
+        <p:style>
+          <a:lnRef idx="2">
+            <a:schemeClr val="accent1">
+              <a:shade val="50000"/>
+            </a:schemeClr>
+          </a:lnRef>
+          <a:fillRef idx="1">
+            <a:schemeClr val="accent1"/>
+          </a:fillRef>
+          <a:effectRef idx="0">
+            <a:schemeClr val="accent1"/>
+          </a:effectRef>
+          <a:fontRef idx="minor">
+            <a:schemeClr val="lt1"/>
+          </a:fontRef>
+        </p:style>
+        <p:txBody>
+          <a:bodyPr rtlCol="0" anchor="ctr"/>
+          <a:lstStyle/>
+          <a:p>
+            <a:pPr algn="ctr"/>
+            <a:endParaRPr lang="en-US"/>
+          </a:p>
+        </p:txBody>
+      </p:sp>
+      <p:pic>
+        <p:nvPicPr>
+          <p:cNvPr id="4" name="Picture 3" descr="A black rectangular object with white lines&#10;&#10;Description automatically generated">
+            <a:extLst>
+              <a:ext uri="{FF2B5EF4-FFF2-40B4-BE49-F238E27FC236}">
+                <a16:creationId xmlns:a16="http://schemas.microsoft.com/office/drawing/2014/main" id="{C9AC64C6-BCBD-1D8F-D4AB-E0137FEE8A33}"/>
+              </a:ext>
+            </a:extLst>
+          </p:cNvPr>
+          <p:cNvPicPr>
+            <a:picLocks noChangeAspect="1"/>
+          </p:cNvPicPr>
+          <p:nvPr/>
+        </p:nvPicPr>
+        <p:blipFill rotWithShape="1">
+          <a:blip r:embed="rId2"/>
+          <a:srcRect l="1333"/>
+          <a:stretch/>
+        </p:blipFill>
+        <p:spPr>
+          <a:xfrm>
+            <a:off x="457199" y="439841"/>
+            <a:ext cx="11277600" cy="5943600"/>
+          </a:xfrm>
+          <a:prstGeom prst="rect">
+            <a:avLst/>
+          </a:prstGeom>
+        </p:spPr>
+      </p:pic>
+      <p:sp>
+        <p:nvSpPr>
+          <p:cNvPr id="5" name="TextBox 4">
+            <a:extLst>
+              <a:ext uri="{FF2B5EF4-FFF2-40B4-BE49-F238E27FC236}">
+                <a16:creationId xmlns:a16="http://schemas.microsoft.com/office/drawing/2014/main" id="{278B3D24-2721-CCC6-002E-7DC4C56C61BD}"/>
+              </a:ext>
+            </a:extLst>
+          </p:cNvPr>
+          <p:cNvSpPr txBox="1"/>
+          <p:nvPr/>
+        </p:nvSpPr>
+        <p:spPr>
+          <a:xfrm>
+            <a:off x="457199" y="44149"/>
+            <a:ext cx="9257523" cy="461665"/>
+          </a:xfrm>
+          <a:prstGeom prst="rect">
+            <a:avLst/>
+          </a:prstGeom>
+          <a:noFill/>
+        </p:spPr>
+        <p:txBody>
+          <a:bodyPr wrap="square">
+            <a:spAutoFit/>
+          </a:bodyPr>
+          <a:lstStyle/>
+          <a:p>
+            <a:r>
+              <a:rPr lang="en-RO" sz="2400" b="1" i="1" u="sng" dirty="0">
+                <a:solidFill>
+                  <a:schemeClr val="bg1"/>
+                </a:solidFill>
+              </a:rPr>
+              <a:t>7. Metodele Statice: join()</a:t>
+            </a:r>
+            <a:endParaRPr lang="en-RO" sz="2400" dirty="0">
+              <a:solidFill>
+                <a:schemeClr val="bg1"/>
+              </a:solidFill>
+            </a:endParaRPr>
+          </a:p>
+        </p:txBody>
+      </p:sp>
+      <p:sp>
+        <p:nvSpPr>
+          <p:cNvPr id="10" name="TextBox 9">
+            <a:extLst>
+              <a:ext uri="{FF2B5EF4-FFF2-40B4-BE49-F238E27FC236}">
+                <a16:creationId xmlns:a16="http://schemas.microsoft.com/office/drawing/2014/main" id="{2E490398-DB41-4FAB-1B61-7CF3D35885A1}"/>
+              </a:ext>
+            </a:extLst>
+          </p:cNvPr>
+          <p:cNvSpPr txBox="1"/>
+          <p:nvPr/>
+        </p:nvSpPr>
+        <p:spPr>
+          <a:xfrm>
+            <a:off x="660067" y="778053"/>
+            <a:ext cx="10434114" cy="2862322"/>
+          </a:xfrm>
+          <a:prstGeom prst="rect">
+            <a:avLst/>
+          </a:prstGeom>
+          <a:noFill/>
+        </p:spPr>
+        <p:txBody>
+          <a:bodyPr wrap="square">
+            <a:spAutoFit/>
+          </a:bodyPr>
+          <a:lstStyle/>
+          <a:p>
+            <a:r>
+              <a:rPr lang="en-GB" b="0" i="0" dirty="0">
+                <a:solidFill>
+                  <a:srgbClr val="2E95D3"/>
+                </a:solidFill>
+                <a:effectLst/>
+                <a:highlight>
+                  <a:srgbClr val="0D0D0D"/>
+                </a:highlight>
+                <a:latin typeface="Söhne Mono"/>
+              </a:rPr>
+              <a:t>public</a:t>
+            </a:r>
+            <a:r>
+              <a:rPr lang="en-GB" b="0" i="0" dirty="0">
+                <a:solidFill>
+                  <a:srgbClr val="FFFFFF"/>
+                </a:solidFill>
+                <a:effectLst/>
+                <a:highlight>
+                  <a:srgbClr val="0D0D0D"/>
+                </a:highlight>
+                <a:latin typeface="Söhne Mono"/>
+              </a:rPr>
+              <a:t> </a:t>
+            </a:r>
+            <a:r>
+              <a:rPr lang="en-GB" b="0" i="0" dirty="0">
+                <a:solidFill>
+                  <a:srgbClr val="2E95D3"/>
+                </a:solidFill>
+                <a:effectLst/>
+                <a:highlight>
+                  <a:srgbClr val="0D0D0D"/>
+                </a:highlight>
+                <a:latin typeface="Söhne Mono"/>
+              </a:rPr>
+              <a:t>class</a:t>
+            </a:r>
+            <a:r>
+              <a:rPr lang="en-GB" b="0" i="0" dirty="0">
+                <a:solidFill>
+                  <a:srgbClr val="FFFFFF"/>
+                </a:solidFill>
+                <a:effectLst/>
+                <a:highlight>
+                  <a:srgbClr val="0D0D0D"/>
+                </a:highlight>
+                <a:latin typeface="Söhne Mono"/>
+              </a:rPr>
+              <a:t> </a:t>
+            </a:r>
+            <a:r>
+              <a:rPr lang="en-GB" b="0" i="0" dirty="0" err="1">
+                <a:solidFill>
+                  <a:srgbClr val="F22C3D"/>
+                </a:solidFill>
+                <a:effectLst/>
+                <a:highlight>
+                  <a:srgbClr val="0D0D0D"/>
+                </a:highlight>
+                <a:latin typeface="Söhne Mono"/>
+              </a:rPr>
+              <a:t>JoinExample</a:t>
+            </a:r>
+            <a:r>
+              <a:rPr lang="en-GB" b="0" i="0" dirty="0">
+                <a:solidFill>
+                  <a:srgbClr val="FFFFFF"/>
+                </a:solidFill>
+                <a:effectLst/>
+                <a:highlight>
+                  <a:srgbClr val="0D0D0D"/>
+                </a:highlight>
+                <a:latin typeface="Söhne Mono"/>
+              </a:rPr>
+              <a:t> { </a:t>
+            </a:r>
+          </a:p>
+          <a:p>
+            <a:r>
+              <a:rPr lang="en-GB" dirty="0">
+                <a:solidFill>
+                  <a:srgbClr val="FFFFFF"/>
+                </a:solidFill>
+                <a:highlight>
+                  <a:srgbClr val="0D0D0D"/>
+                </a:highlight>
+                <a:latin typeface="Söhne Mono"/>
+              </a:rPr>
+              <a:t>   </a:t>
+            </a:r>
+            <a:r>
+              <a:rPr lang="en-GB" b="0" i="0" dirty="0">
+                <a:solidFill>
+                  <a:srgbClr val="2E95D3"/>
+                </a:solidFill>
+                <a:effectLst/>
+                <a:highlight>
+                  <a:srgbClr val="0D0D0D"/>
+                </a:highlight>
+                <a:latin typeface="Söhne Mono"/>
+              </a:rPr>
+              <a:t>public</a:t>
+            </a:r>
+            <a:r>
+              <a:rPr lang="en-GB" b="0" i="0" dirty="0">
+                <a:solidFill>
+                  <a:srgbClr val="FFFFFF"/>
+                </a:solidFill>
+                <a:effectLst/>
+                <a:highlight>
+                  <a:srgbClr val="0D0D0D"/>
+                </a:highlight>
+                <a:latin typeface="Söhne Mono"/>
+              </a:rPr>
+              <a:t> </a:t>
+            </a:r>
+            <a:r>
+              <a:rPr lang="en-GB" b="0" i="0" dirty="0">
+                <a:solidFill>
+                  <a:srgbClr val="2E95D3"/>
+                </a:solidFill>
+                <a:effectLst/>
+                <a:highlight>
+                  <a:srgbClr val="0D0D0D"/>
+                </a:highlight>
+                <a:latin typeface="Söhne Mono"/>
+              </a:rPr>
+              <a:t>static</a:t>
+            </a:r>
+            <a:r>
+              <a:rPr lang="en-GB" b="0" i="0" dirty="0">
+                <a:solidFill>
+                  <a:srgbClr val="FFFFFF"/>
+                </a:solidFill>
+                <a:effectLst/>
+                <a:highlight>
+                  <a:srgbClr val="0D0D0D"/>
+                </a:highlight>
+                <a:latin typeface="Söhne Mono"/>
+              </a:rPr>
+              <a:t> </a:t>
+            </a:r>
+            <a:r>
+              <a:rPr lang="en-GB" b="0" i="0" dirty="0">
+                <a:solidFill>
+                  <a:srgbClr val="2E95D3"/>
+                </a:solidFill>
+                <a:effectLst/>
+                <a:highlight>
+                  <a:srgbClr val="0D0D0D"/>
+                </a:highlight>
+                <a:latin typeface="Söhne Mono"/>
+              </a:rPr>
+              <a:t>void</a:t>
+            </a:r>
+            <a:r>
+              <a:rPr lang="en-GB" b="0" i="0" dirty="0">
+                <a:solidFill>
+                  <a:srgbClr val="FFFFFF"/>
+                </a:solidFill>
+                <a:effectLst/>
+                <a:highlight>
+                  <a:srgbClr val="0D0D0D"/>
+                </a:highlight>
+                <a:latin typeface="Söhne Mono"/>
+              </a:rPr>
+              <a:t> </a:t>
+            </a:r>
+            <a:r>
+              <a:rPr lang="en-GB" b="0" i="0" dirty="0">
+                <a:solidFill>
+                  <a:srgbClr val="F22C3D"/>
+                </a:solidFill>
+                <a:effectLst/>
+                <a:highlight>
+                  <a:srgbClr val="0D0D0D"/>
+                </a:highlight>
+                <a:latin typeface="Söhne Mono"/>
+              </a:rPr>
+              <a:t>main</a:t>
+            </a:r>
+            <a:r>
+              <a:rPr lang="en-GB" b="0" i="0" dirty="0">
+                <a:solidFill>
+                  <a:srgbClr val="FFFFFF"/>
+                </a:solidFill>
+                <a:effectLst/>
+                <a:highlight>
+                  <a:srgbClr val="0D0D0D"/>
+                </a:highlight>
+                <a:latin typeface="Söhne Mono"/>
+              </a:rPr>
+              <a:t>(String[] </a:t>
+            </a:r>
+            <a:r>
+              <a:rPr lang="en-GB" b="0" i="0" dirty="0" err="1">
+                <a:solidFill>
+                  <a:srgbClr val="FFFFFF"/>
+                </a:solidFill>
+                <a:effectLst/>
+                <a:highlight>
+                  <a:srgbClr val="0D0D0D"/>
+                </a:highlight>
+                <a:latin typeface="Söhne Mono"/>
+              </a:rPr>
+              <a:t>args</a:t>
+            </a:r>
+            <a:r>
+              <a:rPr lang="en-GB" b="0" i="0" dirty="0">
+                <a:solidFill>
+                  <a:srgbClr val="FFFFFF"/>
+                </a:solidFill>
+                <a:effectLst/>
+                <a:highlight>
+                  <a:srgbClr val="0D0D0D"/>
+                </a:highlight>
+                <a:latin typeface="Söhne Mono"/>
+              </a:rPr>
+              <a:t>) { String[] words = {</a:t>
+            </a:r>
+          </a:p>
+          <a:p>
+            <a:r>
+              <a:rPr lang="en-GB" dirty="0">
+                <a:solidFill>
+                  <a:srgbClr val="FFFFFF"/>
+                </a:solidFill>
+                <a:highlight>
+                  <a:srgbClr val="0D0D0D"/>
+                </a:highlight>
+                <a:latin typeface="Söhne Mono"/>
+              </a:rPr>
+              <a:t>   </a:t>
+            </a:r>
+            <a:r>
+              <a:rPr lang="en-GB" b="0" i="0" dirty="0">
+                <a:solidFill>
+                  <a:srgbClr val="00A67D"/>
+                </a:solidFill>
+                <a:effectLst/>
+                <a:highlight>
+                  <a:srgbClr val="0D0D0D"/>
+                </a:highlight>
+                <a:latin typeface="Söhne Mono"/>
+              </a:rPr>
+              <a:t>"Hello"</a:t>
+            </a:r>
+            <a:r>
+              <a:rPr lang="en-GB" b="0" i="0" dirty="0">
+                <a:solidFill>
+                  <a:srgbClr val="FFFFFF"/>
+                </a:solidFill>
+                <a:effectLst/>
+                <a:highlight>
+                  <a:srgbClr val="0D0D0D"/>
+                </a:highlight>
+                <a:latin typeface="Söhne Mono"/>
+              </a:rPr>
+              <a:t>, </a:t>
+            </a:r>
+            <a:r>
+              <a:rPr lang="en-GB" b="0" i="0" dirty="0">
+                <a:solidFill>
+                  <a:srgbClr val="00A67D"/>
+                </a:solidFill>
+                <a:effectLst/>
+                <a:highlight>
+                  <a:srgbClr val="0D0D0D"/>
+                </a:highlight>
+                <a:latin typeface="Söhne Mono"/>
+              </a:rPr>
+              <a:t>"World"</a:t>
+            </a:r>
+            <a:r>
+              <a:rPr lang="en-GB" b="0" i="0" dirty="0">
+                <a:solidFill>
+                  <a:srgbClr val="FFFFFF"/>
+                </a:solidFill>
+                <a:effectLst/>
+                <a:highlight>
+                  <a:srgbClr val="0D0D0D"/>
+                </a:highlight>
+                <a:latin typeface="Söhne Mono"/>
+              </a:rPr>
+              <a:t>, </a:t>
+            </a:r>
+            <a:r>
+              <a:rPr lang="en-GB" b="0" i="0" dirty="0">
+                <a:solidFill>
+                  <a:srgbClr val="00A67D"/>
+                </a:solidFill>
+                <a:effectLst/>
+                <a:highlight>
+                  <a:srgbClr val="0D0D0D"/>
+                </a:highlight>
+                <a:latin typeface="Söhne Mono"/>
+              </a:rPr>
+              <a:t>"Java"</a:t>
+            </a:r>
+            <a:r>
+              <a:rPr lang="en-GB" b="0" i="0" dirty="0">
+                <a:solidFill>
+                  <a:srgbClr val="FFFFFF"/>
+                </a:solidFill>
+                <a:effectLst/>
+                <a:highlight>
+                  <a:srgbClr val="0D0D0D"/>
+                </a:highlight>
+                <a:latin typeface="Söhne Mono"/>
+              </a:rPr>
+              <a:t>}; </a:t>
+            </a:r>
+          </a:p>
+          <a:p>
+            <a:r>
+              <a:rPr lang="en-GB" dirty="0">
+                <a:solidFill>
+                  <a:srgbClr val="FFFFFF"/>
+                </a:solidFill>
+                <a:highlight>
+                  <a:srgbClr val="0D0D0D"/>
+                </a:highlight>
+                <a:latin typeface="Söhne Mono"/>
+              </a:rPr>
+              <a:t>   </a:t>
+            </a:r>
+            <a:r>
+              <a:rPr lang="en-GB" b="0" i="0" dirty="0">
+                <a:solidFill>
+                  <a:schemeClr val="bg1"/>
+                </a:solidFill>
+                <a:effectLst/>
+                <a:highlight>
+                  <a:srgbClr val="0D0D0D"/>
+                </a:highlight>
+                <a:latin typeface="Söhne Mono"/>
+              </a:rPr>
+              <a:t>// Joining array elements with a space delimite</a:t>
+            </a:r>
+            <a:r>
+              <a:rPr lang="en-GB" b="0" i="0" dirty="0">
+                <a:effectLst/>
+                <a:highlight>
+                  <a:srgbClr val="0D0D0D"/>
+                </a:highlight>
+                <a:latin typeface="Söhne Mono"/>
+              </a:rPr>
+              <a:t>r</a:t>
+            </a:r>
+            <a:r>
+              <a:rPr lang="en-GB" b="0" i="0" dirty="0">
+                <a:solidFill>
+                  <a:srgbClr val="FFFFFF"/>
+                </a:solidFill>
+                <a:effectLst/>
+                <a:highlight>
+                  <a:srgbClr val="0D0D0D"/>
+                </a:highlight>
+                <a:latin typeface="Söhne Mono"/>
+              </a:rPr>
+              <a:t> </a:t>
+            </a:r>
+          </a:p>
+          <a:p>
+            <a:r>
+              <a:rPr lang="en-GB" dirty="0">
+                <a:solidFill>
+                  <a:srgbClr val="FFFFFF"/>
+                </a:solidFill>
+                <a:highlight>
+                  <a:srgbClr val="0D0D0D"/>
+                </a:highlight>
+                <a:latin typeface="Söhne Mono"/>
+              </a:rPr>
+              <a:t>   </a:t>
+            </a:r>
+            <a:r>
+              <a:rPr lang="en-GB" b="0" i="0" dirty="0">
+                <a:solidFill>
+                  <a:srgbClr val="DF3079"/>
+                </a:solidFill>
+                <a:effectLst/>
+                <a:highlight>
+                  <a:srgbClr val="0D0D0D"/>
+                </a:highlight>
+                <a:latin typeface="Söhne Mono"/>
+              </a:rPr>
+              <a:t>String</a:t>
+            </a:r>
+            <a:r>
+              <a:rPr lang="en-GB" b="0" i="0" dirty="0">
+                <a:solidFill>
+                  <a:srgbClr val="FFFFFF"/>
+                </a:solidFill>
+                <a:effectLst/>
+                <a:highlight>
+                  <a:srgbClr val="0D0D0D"/>
+                </a:highlight>
+                <a:latin typeface="Söhne Mono"/>
+              </a:rPr>
+              <a:t> </a:t>
+            </a:r>
+            <a:r>
+              <a:rPr lang="en-GB" b="0" i="0" dirty="0" err="1">
+                <a:solidFill>
+                  <a:srgbClr val="DF3079"/>
+                </a:solidFill>
+                <a:effectLst/>
+                <a:highlight>
+                  <a:srgbClr val="0D0D0D"/>
+                </a:highlight>
+                <a:latin typeface="Söhne Mono"/>
+              </a:rPr>
+              <a:t>joinedString</a:t>
+            </a:r>
+            <a:r>
+              <a:rPr lang="en-GB" b="0" i="0" dirty="0">
+                <a:solidFill>
+                  <a:srgbClr val="FFFFFF"/>
+                </a:solidFill>
+                <a:effectLst/>
+                <a:highlight>
+                  <a:srgbClr val="0D0D0D"/>
+                </a:highlight>
+                <a:latin typeface="Söhne Mono"/>
+              </a:rPr>
+              <a:t> = </a:t>
+            </a:r>
+            <a:r>
+              <a:rPr lang="en-GB" b="0" i="0" dirty="0" err="1">
+                <a:solidFill>
+                  <a:srgbClr val="FFFFFF"/>
+                </a:solidFill>
+                <a:effectLst/>
+                <a:highlight>
+                  <a:srgbClr val="0D0D0D"/>
+                </a:highlight>
+                <a:latin typeface="Söhne Mono"/>
+              </a:rPr>
+              <a:t>String.join</a:t>
+            </a:r>
+            <a:r>
+              <a:rPr lang="en-GB" b="0" i="0" dirty="0">
+                <a:solidFill>
+                  <a:srgbClr val="FFFFFF"/>
+                </a:solidFill>
+                <a:effectLst/>
+                <a:highlight>
+                  <a:srgbClr val="0D0D0D"/>
+                </a:highlight>
+                <a:latin typeface="Söhne Mono"/>
+              </a:rPr>
+              <a:t>(</a:t>
+            </a:r>
+            <a:r>
+              <a:rPr lang="en-GB" b="0" i="0" dirty="0">
+                <a:solidFill>
+                  <a:srgbClr val="00A67D"/>
+                </a:solidFill>
+                <a:effectLst/>
+                <a:highlight>
+                  <a:srgbClr val="0D0D0D"/>
+                </a:highlight>
+                <a:latin typeface="Söhne Mono"/>
+              </a:rPr>
+              <a:t>" "</a:t>
+            </a:r>
+            <a:r>
+              <a:rPr lang="en-GB" b="0" i="0" dirty="0">
+                <a:solidFill>
+                  <a:srgbClr val="FFFFFF"/>
+                </a:solidFill>
+                <a:effectLst/>
+                <a:highlight>
+                  <a:srgbClr val="0D0D0D"/>
+                </a:highlight>
+                <a:latin typeface="Söhne Mono"/>
+              </a:rPr>
+              <a:t>, words); </a:t>
+            </a:r>
+          </a:p>
+          <a:p>
+            <a:r>
+              <a:rPr lang="en-GB" dirty="0">
+                <a:solidFill>
+                  <a:srgbClr val="FFFFFF"/>
+                </a:solidFill>
+                <a:highlight>
+                  <a:srgbClr val="0D0D0D"/>
+                </a:highlight>
+                <a:latin typeface="Söhne Mono"/>
+              </a:rPr>
+              <a:t>   </a:t>
+            </a:r>
+            <a:r>
+              <a:rPr lang="en-GB" b="0" i="0" dirty="0" err="1">
+                <a:solidFill>
+                  <a:srgbClr val="FFFFFF"/>
+                </a:solidFill>
+                <a:effectLst/>
+                <a:highlight>
+                  <a:srgbClr val="0D0D0D"/>
+                </a:highlight>
+                <a:latin typeface="Söhne Mono"/>
+              </a:rPr>
+              <a:t>System.out.println</a:t>
+            </a:r>
+            <a:r>
+              <a:rPr lang="en-GB" b="0" i="0" dirty="0">
+                <a:solidFill>
+                  <a:srgbClr val="FFFFFF"/>
+                </a:solidFill>
+                <a:effectLst/>
+                <a:highlight>
+                  <a:srgbClr val="0D0D0D"/>
+                </a:highlight>
+                <a:latin typeface="Söhne Mono"/>
+              </a:rPr>
+              <a:t>(</a:t>
+            </a:r>
+            <a:r>
+              <a:rPr lang="en-GB" b="0" i="0" dirty="0">
+                <a:solidFill>
+                  <a:srgbClr val="00A67D"/>
+                </a:solidFill>
+                <a:effectLst/>
+                <a:highlight>
+                  <a:srgbClr val="0D0D0D"/>
+                </a:highlight>
+                <a:latin typeface="Söhne Mono"/>
+              </a:rPr>
+              <a:t>"Joined string: "</a:t>
+            </a:r>
+            <a:r>
+              <a:rPr lang="en-GB" b="0" i="0" dirty="0">
+                <a:solidFill>
+                  <a:srgbClr val="FFFFFF"/>
+                </a:solidFill>
+                <a:effectLst/>
+                <a:highlight>
+                  <a:srgbClr val="0D0D0D"/>
+                </a:highlight>
+                <a:latin typeface="Söhne Mono"/>
+              </a:rPr>
+              <a:t> + </a:t>
+            </a:r>
+            <a:r>
+              <a:rPr lang="en-GB" b="0" i="0" dirty="0" err="1">
+                <a:solidFill>
+                  <a:srgbClr val="FFFFFF"/>
+                </a:solidFill>
+                <a:effectLst/>
+                <a:highlight>
+                  <a:srgbClr val="0D0D0D"/>
+                </a:highlight>
+                <a:latin typeface="Söhne Mono"/>
+              </a:rPr>
+              <a:t>joinedString</a:t>
+            </a:r>
+            <a:r>
+              <a:rPr lang="en-GB" b="0" i="0" dirty="0">
+                <a:solidFill>
+                  <a:schemeClr val="bg1"/>
+                </a:solidFill>
+                <a:effectLst/>
+                <a:highlight>
+                  <a:srgbClr val="0D0D0D"/>
+                </a:highlight>
+                <a:latin typeface="Söhne Mono"/>
+              </a:rPr>
+              <a:t>); </a:t>
+            </a:r>
+          </a:p>
+          <a:p>
+            <a:r>
+              <a:rPr lang="en-GB" dirty="0">
+                <a:solidFill>
+                  <a:schemeClr val="bg1"/>
+                </a:solidFill>
+                <a:highlight>
+                  <a:srgbClr val="0D0D0D"/>
+                </a:highlight>
+                <a:latin typeface="Söhne Mono"/>
+              </a:rPr>
+              <a:t>   </a:t>
+            </a:r>
+            <a:r>
+              <a:rPr lang="en-GB" b="0" i="0" dirty="0">
+                <a:solidFill>
+                  <a:schemeClr val="bg1"/>
+                </a:solidFill>
+                <a:effectLst/>
+                <a:highlight>
+                  <a:srgbClr val="0D0D0D"/>
+                </a:highlight>
+                <a:latin typeface="Söhne Mono"/>
+              </a:rPr>
+              <a:t>// Joining array elements with a comma delimiter </a:t>
+            </a:r>
+            <a:r>
+              <a:rPr lang="en-GB" b="0" i="0" dirty="0">
+                <a:solidFill>
+                  <a:srgbClr val="DF3079"/>
+                </a:solidFill>
+                <a:effectLst/>
+                <a:highlight>
+                  <a:srgbClr val="0D0D0D"/>
+                </a:highlight>
+                <a:latin typeface="Söhne Mono"/>
+              </a:rPr>
+              <a:t>String</a:t>
+            </a:r>
+            <a:r>
+              <a:rPr lang="en-GB" b="0" i="0" dirty="0">
+                <a:solidFill>
+                  <a:srgbClr val="FFFFFF"/>
+                </a:solidFill>
+                <a:effectLst/>
+                <a:highlight>
+                  <a:srgbClr val="0D0D0D"/>
+                </a:highlight>
+                <a:latin typeface="Söhne Mono"/>
+              </a:rPr>
+              <a:t> </a:t>
+            </a:r>
+            <a:r>
+              <a:rPr lang="en-GB" b="0" i="0" dirty="0" err="1">
+                <a:solidFill>
+                  <a:srgbClr val="DF3079"/>
+                </a:solidFill>
+                <a:effectLst/>
+                <a:highlight>
+                  <a:srgbClr val="0D0D0D"/>
+                </a:highlight>
+                <a:latin typeface="Söhne Mono"/>
+              </a:rPr>
+              <a:t>csvString</a:t>
+            </a:r>
+            <a:r>
+              <a:rPr lang="en-GB" b="0" i="0" dirty="0">
+                <a:solidFill>
+                  <a:srgbClr val="FFFFFF"/>
+                </a:solidFill>
+                <a:effectLst/>
+                <a:highlight>
+                  <a:srgbClr val="0D0D0D"/>
+                </a:highlight>
+                <a:latin typeface="Söhne Mono"/>
+              </a:rPr>
+              <a:t> = </a:t>
+            </a:r>
+            <a:r>
+              <a:rPr lang="en-GB" b="0" i="0" dirty="0" err="1">
+                <a:solidFill>
+                  <a:srgbClr val="FFFFFF"/>
+                </a:solidFill>
+                <a:effectLst/>
+                <a:highlight>
+                  <a:srgbClr val="0D0D0D"/>
+                </a:highlight>
+                <a:latin typeface="Söhne Mono"/>
+              </a:rPr>
+              <a:t>String.join</a:t>
+            </a:r>
+            <a:r>
+              <a:rPr lang="en-GB" b="0" i="0" dirty="0">
+                <a:solidFill>
+                  <a:srgbClr val="FFFFFF"/>
+                </a:solidFill>
+                <a:effectLst/>
+                <a:highlight>
+                  <a:srgbClr val="0D0D0D"/>
+                </a:highlight>
+                <a:latin typeface="Söhne Mono"/>
+              </a:rPr>
+              <a:t>(</a:t>
+            </a:r>
+            <a:r>
+              <a:rPr lang="en-GB" b="0" i="0" dirty="0">
+                <a:solidFill>
+                  <a:srgbClr val="00A67D"/>
+                </a:solidFill>
+                <a:effectLst/>
+                <a:highlight>
+                  <a:srgbClr val="0D0D0D"/>
+                </a:highlight>
+                <a:latin typeface="Söhne Mono"/>
+              </a:rPr>
+              <a:t>", "</a:t>
+            </a:r>
+            <a:r>
+              <a:rPr lang="en-GB" b="0" i="0" dirty="0">
+                <a:solidFill>
+                  <a:srgbClr val="FFFFFF"/>
+                </a:solidFill>
+                <a:effectLst/>
+                <a:highlight>
+                  <a:srgbClr val="0D0D0D"/>
+                </a:highlight>
+                <a:latin typeface="Söhne Mono"/>
+              </a:rPr>
+              <a:t>, words);</a:t>
+            </a:r>
+            <a:endParaRPr lang="en-GB" dirty="0">
+              <a:solidFill>
+                <a:schemeClr val="bg1"/>
+              </a:solidFill>
+              <a:highlight>
+                <a:srgbClr val="0D0D0D"/>
+              </a:highlight>
+              <a:latin typeface="Söhne Mono"/>
+            </a:endParaRPr>
+          </a:p>
+          <a:p>
+            <a:r>
+              <a:rPr lang="en-GB" b="0" i="0" dirty="0">
+                <a:solidFill>
+                  <a:schemeClr val="bg1"/>
+                </a:solidFill>
+                <a:effectLst/>
+                <a:highlight>
+                  <a:srgbClr val="0D0D0D"/>
+                </a:highlight>
+                <a:latin typeface="Söhne Mono"/>
+              </a:rPr>
+              <a:t>   </a:t>
+            </a:r>
+            <a:r>
+              <a:rPr lang="en-GB" b="0" i="0" dirty="0" err="1">
+                <a:solidFill>
+                  <a:srgbClr val="FFFFFF"/>
+                </a:solidFill>
+                <a:effectLst/>
+                <a:highlight>
+                  <a:srgbClr val="0D0D0D"/>
+                </a:highlight>
+                <a:latin typeface="Söhne Mono"/>
+              </a:rPr>
+              <a:t>System.out.println</a:t>
+            </a:r>
+            <a:r>
+              <a:rPr lang="en-GB" b="0" i="0" dirty="0">
+                <a:solidFill>
+                  <a:srgbClr val="FFFFFF"/>
+                </a:solidFill>
+                <a:effectLst/>
+                <a:highlight>
+                  <a:srgbClr val="0D0D0D"/>
+                </a:highlight>
+                <a:latin typeface="Söhne Mono"/>
+              </a:rPr>
+              <a:t>(</a:t>
+            </a:r>
+            <a:r>
+              <a:rPr lang="en-GB" b="0" i="0" dirty="0">
+                <a:solidFill>
+                  <a:srgbClr val="00A67D"/>
+                </a:solidFill>
+                <a:effectLst/>
+                <a:highlight>
+                  <a:srgbClr val="0D0D0D"/>
+                </a:highlight>
+                <a:latin typeface="Söhne Mono"/>
+              </a:rPr>
+              <a:t>"CSV string: "</a:t>
+            </a:r>
+            <a:r>
+              <a:rPr lang="en-GB" b="0" i="0" dirty="0">
+                <a:solidFill>
+                  <a:srgbClr val="FFFFFF"/>
+                </a:solidFill>
+                <a:effectLst/>
+                <a:highlight>
+                  <a:srgbClr val="0D0D0D"/>
+                </a:highlight>
+                <a:latin typeface="Söhne Mono"/>
+              </a:rPr>
+              <a:t> + </a:t>
+            </a:r>
+            <a:r>
+              <a:rPr lang="en-GB" b="0" i="0" dirty="0" err="1">
+                <a:solidFill>
+                  <a:srgbClr val="FFFFFF"/>
+                </a:solidFill>
+                <a:effectLst/>
+                <a:highlight>
+                  <a:srgbClr val="0D0D0D"/>
+                </a:highlight>
+                <a:latin typeface="Söhne Mono"/>
+              </a:rPr>
+              <a:t>csvString</a:t>
+            </a:r>
+            <a:r>
+              <a:rPr lang="en-GB" b="0" i="0" dirty="0">
+                <a:solidFill>
+                  <a:srgbClr val="FFFFFF"/>
+                </a:solidFill>
+                <a:effectLst/>
+                <a:highlight>
+                  <a:srgbClr val="0D0D0D"/>
+                </a:highlight>
+                <a:latin typeface="Söhne Mono"/>
+              </a:rPr>
+              <a:t>); </a:t>
+            </a:r>
+          </a:p>
+          <a:p>
+            <a:r>
+              <a:rPr lang="en-GB" dirty="0">
+                <a:solidFill>
+                  <a:srgbClr val="FFFFFF"/>
+                </a:solidFill>
+                <a:highlight>
+                  <a:srgbClr val="0D0D0D"/>
+                </a:highlight>
+                <a:latin typeface="Söhne Mono"/>
+              </a:rPr>
+              <a:t>   </a:t>
+            </a:r>
+            <a:r>
+              <a:rPr lang="en-GB" b="0" i="0" dirty="0">
+                <a:solidFill>
+                  <a:srgbClr val="FFFFFF"/>
+                </a:solidFill>
+                <a:effectLst/>
+                <a:highlight>
+                  <a:srgbClr val="0D0D0D"/>
+                </a:highlight>
+                <a:latin typeface="Söhne Mono"/>
+              </a:rPr>
+              <a:t>} </a:t>
+            </a:r>
+          </a:p>
+          <a:p>
+            <a:r>
+              <a:rPr lang="en-GB" b="0" i="0" dirty="0">
+                <a:solidFill>
+                  <a:srgbClr val="FFFFFF"/>
+                </a:solidFill>
+                <a:effectLst/>
+                <a:highlight>
+                  <a:srgbClr val="0D0D0D"/>
+                </a:highlight>
+                <a:latin typeface="Söhne Mono"/>
+              </a:rPr>
+              <a:t>}</a:t>
+            </a:r>
+            <a:endParaRPr lang="en-RO" dirty="0"/>
+          </a:p>
+        </p:txBody>
+      </p:sp>
+      <p:pic>
+        <p:nvPicPr>
+          <p:cNvPr id="2" name="Picture 1">
+            <a:extLst>
+              <a:ext uri="{FF2B5EF4-FFF2-40B4-BE49-F238E27FC236}">
+                <a16:creationId xmlns:a16="http://schemas.microsoft.com/office/drawing/2014/main" id="{297757BA-46AA-AFE5-9F38-3A50B2EC3116}"/>
+              </a:ext>
+            </a:extLst>
+          </p:cNvPr>
+          <p:cNvPicPr>
+            <a:picLocks noChangeAspect="1"/>
+          </p:cNvPicPr>
+          <p:nvPr/>
+        </p:nvPicPr>
+        <p:blipFill>
+          <a:blip r:embed="rId3"/>
+          <a:stretch>
+            <a:fillRect/>
+          </a:stretch>
+        </p:blipFill>
+        <p:spPr>
+          <a:xfrm>
+            <a:off x="985519" y="4036067"/>
+            <a:ext cx="9368655" cy="1062144"/>
+          </a:xfrm>
+          <a:prstGeom prst="rect">
+            <a:avLst/>
+          </a:prstGeom>
+        </p:spPr>
+      </p:pic>
+    </p:spTree>
+    <p:extLst>
+      <p:ext uri="{BB962C8B-B14F-4D97-AF65-F5344CB8AC3E}">
+        <p14:creationId xmlns:p14="http://schemas.microsoft.com/office/powerpoint/2010/main" val="3752922856"/>
+      </p:ext>
+    </p:extLst>
+  </p:cSld>
+  <p:clrMapOvr>
+    <a:masterClrMapping/>
+  </p:clrMapOvr>
+</p:sld>
+</file>
+
 <file path=ppt/slides/slide2.xml><?xml version="1.0" encoding="utf-8"?>
 <p:sld xmlns:a="http://schemas.openxmlformats.org/drawingml/2006/main" xmlns:r="http://schemas.openxmlformats.org/officeDocument/2006/relationships" xmlns:p="http://schemas.openxmlformats.org/presentationml/2006/main">
   <p:cSld>
@@ -17008,7 +21110,7 @@
                 </a:highlight>
                 <a:latin typeface="Söhne Mono"/>
               </a:rPr>
-              <a:t>"Hello, %s!%n"</a:t>
+              <a:t>"Hello, %!%n"</a:t>
             </a:r>
             <a:r>
               <a:rPr lang="en-GB" b="0" i="0" dirty="0">
@@ -17129,6 +21231,18 @@
                 <a:latin typeface="Söhne Mono"/>
               </a:rPr>
               <a:t> </a:t>
+            </a:r>
+            <a:r>
+              <a:rPr lang="en-GB" dirty="0" err="1">
+                <a:solidFill>
+                  <a:srgbClr val="00A67D"/>
+                </a:solidFill>
+                <a:highlight>
+                  <a:srgbClr val="0D0D0D"/>
+                </a:highlight>
+                <a:latin typeface="Söhne Mono"/>
+              </a:rPr>
+              <a:t>s</a:t>
             </a:r>
             <a:r>
               <a:rPr lang="en-GB" b="0" i="0" dirty="0" err="1">

</xml_diff>